<commit_message>
Modifica lez2.pptx di root
</commit_message>
<xml_diff>
--- a/course_materials/23-24/root/lez2.pptx
+++ b/course_materials/23-24/root/lez2.pptx
@@ -2639,7 +2639,7 @@
       </p:grpSpPr>
       <p:sp>
         <p:nvSpPr>
-          <p:cNvPr id="90" name="Google Shape;90;g2cf0d709f11_2_0:notes"/>
+          <p:cNvPr id="90" name="Google Shape;90;g2ce46935d93_0_60:notes"/>
           <p:cNvSpPr/>
           <p:nvPr>
             <p:ph idx="2" type="sldImg"/>
@@ -2674,7 +2674,7 @@
       </p:sp>
       <p:sp>
         <p:nvSpPr>
-          <p:cNvPr id="91" name="Google Shape;91;g2cf0d709f11_2_0:notes"/>
+          <p:cNvPr id="91" name="Google Shape;91;g2ce46935d93_0_60:notes"/>
           <p:cNvSpPr txBox="1"/>
           <p:nvPr>
             <p:ph idx="1" type="body"/>
@@ -2724,7 +2724,7 @@
   <p:cSld>
     <p:spTree>
       <p:nvGrpSpPr>
-        <p:cNvPr id="96" name="Shape 96"/>
+        <p:cNvPr id="94" name="Shape 94"/>
         <p:cNvGrpSpPr/>
         <p:nvPr/>
       </p:nvGrpSpPr>
@@ -2738,7 +2738,7 @@
       </p:grpSpPr>
       <p:sp>
         <p:nvSpPr>
-          <p:cNvPr id="97" name="Google Shape;97;g2ce46935d93_0_60:notes"/>
+          <p:cNvPr id="95" name="Google Shape;95;g2ce46935d93_0_55:notes"/>
           <p:cNvSpPr/>
           <p:nvPr>
             <p:ph idx="2" type="sldImg"/>
@@ -2773,7 +2773,7 @@
       </p:sp>
       <p:sp>
         <p:nvSpPr>
-          <p:cNvPr id="98" name="Google Shape;98;g2ce46935d93_0_60:notes"/>
+          <p:cNvPr id="96" name="Google Shape;96;g2ce46935d93_0_55:notes"/>
           <p:cNvSpPr txBox="1"/>
           <p:nvPr>
             <p:ph idx="1" type="body"/>
@@ -2837,7 +2837,7 @@
       </p:grpSpPr>
       <p:sp>
         <p:nvSpPr>
-          <p:cNvPr id="102" name="Google Shape;102;g2ce46935d93_0_55:notes"/>
+          <p:cNvPr id="102" name="Google Shape;102;g2cf0d709f11_2_0:notes"/>
           <p:cNvSpPr/>
           <p:nvPr>
             <p:ph idx="2" type="sldImg"/>
@@ -2872,7 +2872,7 @@
       </p:sp>
       <p:sp>
         <p:nvSpPr>
-          <p:cNvPr id="103" name="Google Shape;103;g2ce46935d93_0_55:notes"/>
+          <p:cNvPr id="103" name="Google Shape;103;g2cf0d709f11_2_0:notes"/>
           <p:cNvSpPr txBox="1"/>
           <p:nvPr>
             <p:ph idx="1" type="body"/>
@@ -14518,28 +14518,7 @@
                 <a:cs typeface="Roboto Mono"/>
                 <a:sym typeface="Roboto Mono"/>
               </a:rPr>
-              <a:t>[</a:t>
-            </a:r>
-            <a:r>
-              <a:rPr lang="it" sz="1800">
-                <a:solidFill>
-                  <a:srgbClr val="1AB1CD"/>
-                </a:solidFill>
-                <a:latin typeface="Roboto Mono"/>
-                <a:ea typeface="Roboto Mono"/>
-                <a:cs typeface="Roboto Mono"/>
-                <a:sym typeface="Roboto Mono"/>
-              </a:rPr>
-              <a:t>n</a:t>
-            </a:r>
-            <a:r>
-              <a:rPr lang="it" sz="1800">
-                <a:latin typeface="Roboto Mono"/>
-                <a:ea typeface="Roboto Mono"/>
-                <a:cs typeface="Roboto Mono"/>
-                <a:sym typeface="Roboto Mono"/>
-              </a:rPr>
-              <a:t>] </a:t>
+              <a:t>[] </a:t>
             </a:r>
             <a:r>
               <a:rPr b="1" lang="it" sz="1800">
@@ -14685,28 +14664,7 @@
                 <a:cs typeface="Roboto Mono"/>
                 <a:sym typeface="Roboto Mono"/>
               </a:rPr>
-              <a:t>[</a:t>
-            </a:r>
-            <a:r>
-              <a:rPr lang="it" sz="1800">
-                <a:solidFill>
-                  <a:srgbClr val="1AB1CD"/>
-                </a:solidFill>
-                <a:latin typeface="Roboto Mono"/>
-                <a:ea typeface="Roboto Mono"/>
-                <a:cs typeface="Roboto Mono"/>
-                <a:sym typeface="Roboto Mono"/>
-              </a:rPr>
-              <a:t>n</a:t>
-            </a:r>
-            <a:r>
-              <a:rPr lang="it" sz="1800">
-                <a:latin typeface="Roboto Mono"/>
-                <a:ea typeface="Roboto Mono"/>
-                <a:cs typeface="Roboto Mono"/>
-                <a:sym typeface="Roboto Mono"/>
-              </a:rPr>
-              <a:t>] </a:t>
+              <a:t>[] </a:t>
             </a:r>
             <a:r>
               <a:rPr b="1" lang="it" sz="1800">
@@ -15036,6 +14994,71 @@
         </p:nvSpPr>
         <p:spPr>
           <a:xfrm>
+            <a:off x="311700" y="2150850"/>
+            <a:ext cx="8520600" cy="841800"/>
+          </a:xfrm>
+          <a:prstGeom prst="rect">
+            <a:avLst/>
+          </a:prstGeom>
+        </p:spPr>
+        <p:txBody>
+          <a:bodyPr anchorCtr="0" anchor="ctr" bIns="91425" lIns="91425" spcFirstLastPara="1" rIns="91425" wrap="square" tIns="91425">
+            <a:normAutofit/>
+          </a:bodyPr>
+          <a:lstStyle/>
+          <a:p>
+            <a:pPr indent="0" lvl="0" marL="0" rtl="0" algn="ctr">
+              <a:spcBef>
+                <a:spcPts val="0"/>
+              </a:spcBef>
+              <a:spcAft>
+                <a:spcPts val="0"/>
+              </a:spcAft>
+              <a:buNone/>
+            </a:pPr>
+            <a:r>
+              <a:rPr lang="it"/>
+              <a:t>Grafici con incertezze</a:t>
+            </a:r>
+            <a:endParaRPr/>
+          </a:p>
+        </p:txBody>
+      </p:sp>
+    </p:spTree>
+  </p:cSld>
+  <p:clrMapOvr>
+    <a:masterClrMapping/>
+  </p:clrMapOvr>
+</p:sld>
+</file>
+
+<file path=ppt/slides/slide8.xml><?xml version="1.0" encoding="utf-8"?>
+<p:sld xmlns:a="http://schemas.openxmlformats.org/drawingml/2006/main" xmlns:r="http://schemas.openxmlformats.org/officeDocument/2006/relationships" xmlns:mc="http://schemas.openxmlformats.org/markup-compatibility/2006" xmlns:mv="urn:schemas-microsoft-com:mac:vml" xmlns:p="http://schemas.openxmlformats.org/presentationml/2006/main" xmlns:c="http://schemas.openxmlformats.org/drawingml/2006/chart" xmlns:dgm="http://schemas.openxmlformats.org/drawingml/2006/diagram" xmlns:o="urn:schemas-microsoft-com:office:office" xmlns:v="urn:schemas-microsoft-com:vml" xmlns:pvml="urn:schemas-microsoft-com:office:powerpoint" xmlns:com="http://schemas.openxmlformats.org/drawingml/2006/compatibility" xmlns:p14="http://schemas.microsoft.com/office/powerpoint/2010/main" xmlns:p15="http://schemas.microsoft.com/office/powerpoint/2012/main" xmlns:ahyp="http://schemas.microsoft.com/office/drawing/2018/hyperlinkcolor">
+  <p:cSld>
+    <p:spTree>
+      <p:nvGrpSpPr>
+        <p:cNvPr id="97" name="Shape 97"/>
+        <p:cNvGrpSpPr/>
+        <p:nvPr/>
+      </p:nvGrpSpPr>
+      <p:grpSpPr>
+        <a:xfrm>
+          <a:off x="0" y="0"/>
+          <a:ext cx="0" cy="0"/>
+          <a:chOff x="0" y="0"/>
+          <a:chExt cx="0" cy="0"/>
+        </a:xfrm>
+      </p:grpSpPr>
+      <p:sp>
+        <p:nvSpPr>
+          <p:cNvPr id="98" name="Google Shape;98;p20"/>
+          <p:cNvSpPr txBox="1"/>
+          <p:nvPr>
+            <p:ph type="title"/>
+          </p:nvPr>
+        </p:nvSpPr>
+        <p:spPr>
+          <a:xfrm>
             <a:off x="311700" y="445025"/>
             <a:ext cx="8520600" cy="572700"/>
           </a:xfrm>
@@ -15060,7 +15083,22 @@
             </a:pPr>
             <a:r>
               <a:rPr lang="it"/>
-              <a:t>Caricare dati via array</a:t>
+              <a:t>Classe TGraphErrors</a:t>
+            </a:r>
+            <a:endParaRPr/>
+          </a:p>
+          <a:p>
+            <a:pPr indent="0" lvl="0" marL="0" rtl="0" algn="l">
+              <a:spcBef>
+                <a:spcPts val="0"/>
+              </a:spcBef>
+              <a:spcAft>
+                <a:spcPts val="0"/>
+              </a:spcAft>
+              <a:buNone/>
+            </a:pPr>
+            <a:r>
+              <a:t/>
             </a:r>
             <a:endParaRPr/>
           </a:p>
@@ -15068,7 +15106,7 @@
       </p:sp>
       <p:sp>
         <p:nvSpPr>
-          <p:cNvPr id="94" name="Google Shape;94;p19"/>
+          <p:cNvPr id="99" name="Google Shape;99;p20"/>
           <p:cNvSpPr txBox="1"/>
           <p:nvPr>
             <p:ph idx="1" type="body"/>
@@ -15077,7 +15115,7 @@
         <p:spPr>
           <a:xfrm>
             <a:off x="311700" y="1152475"/>
-            <a:ext cx="8520600" cy="572700"/>
+            <a:ext cx="8520600" cy="3416400"/>
           </a:xfrm>
           <a:prstGeom prst="rect">
             <a:avLst/>
@@ -15094,13 +15132,43 @@
                 <a:spcPts val="0"/>
               </a:spcBef>
               <a:spcAft>
+                <a:spcPts val="0"/>
+              </a:spcAft>
+              <a:buNone/>
+            </a:pPr>
+            <a:r>
+              <a:rPr lang="it"/>
+              <a:t>deriva dalla classe TGraph ed eredita tutti i metodi (come Draw e Fit)</a:t>
+            </a:r>
+            <a:endParaRPr/>
+          </a:p>
+          <a:p>
+            <a:pPr indent="0" lvl="0" marL="0" rtl="0" algn="l">
+              <a:spcBef>
                 <a:spcPts val="1200"/>
+              </a:spcBef>
+              <a:spcAft>
+                <a:spcPts val="0"/>
               </a:spcAft>
               <a:buNone/>
             </a:pPr>
             <a:r>
-              <a:rPr lang="it"/>
-              <a:t>se l’errore è nullo, basta usare nullptr</a:t>
+              <a:t/>
+            </a:r>
+            <a:endParaRPr/>
+          </a:p>
+          <a:p>
+            <a:pPr indent="0" lvl="0" marL="0" rtl="0" algn="l">
+              <a:spcBef>
+                <a:spcPts val="1200"/>
+              </a:spcBef>
+              <a:spcAft>
+                <a:spcPts val="1200"/>
+              </a:spcAft>
+              <a:buNone/>
+            </a:pPr>
+            <a:r>
+              <a:t/>
             </a:r>
             <a:endParaRPr/>
           </a:p>
@@ -15108,14 +15176,14 @@
       </p:sp>
       <p:sp>
         <p:nvSpPr>
-          <p:cNvPr id="95" name="Google Shape;95;p19"/>
+          <p:cNvPr id="100" name="Google Shape;100;p20"/>
           <p:cNvSpPr txBox="1"/>
           <p:nvPr/>
         </p:nvSpPr>
         <p:spPr>
           <a:xfrm>
-            <a:off x="1102650" y="1859925"/>
-            <a:ext cx="6938700" cy="2894400"/>
+            <a:off x="311700" y="2200675"/>
+            <a:ext cx="8427300" cy="1795200"/>
           </a:xfrm>
           <a:prstGeom prst="rect">
             <a:avLst/>
@@ -15142,7 +15210,7 @@
         </p:spPr>
         <p:txBody>
           <a:bodyPr anchorCtr="0" anchor="ctr" bIns="144000" lIns="144000" spcFirstLastPara="1" rIns="144000" wrap="square" tIns="108000">
-            <a:noAutofit/>
+            <a:spAutoFit/>
           </a:bodyPr>
           <a:lstStyle/>
           <a:p>
@@ -15161,14 +15229,14 @@
             <a:r>
               <a:rPr lang="it" sz="1800">
                 <a:solidFill>
-                  <a:srgbClr val="008050"/>
-                </a:solidFill>
-                <a:latin typeface="Roboto Mono"/>
-                <a:ea typeface="Roboto Mono"/>
-                <a:cs typeface="Roboto Mono"/>
-                <a:sym typeface="Roboto Mono"/>
-              </a:rPr>
-              <a:t>int</a:t>
+                  <a:srgbClr val="1AB1CD"/>
+                </a:solidFill>
+                <a:latin typeface="Roboto Mono"/>
+                <a:ea typeface="Roboto Mono"/>
+                <a:cs typeface="Roboto Mono"/>
+                <a:sym typeface="Roboto Mono"/>
+              </a:rPr>
+              <a:t>TGraphErrors</a:t>
             </a:r>
             <a:r>
               <a:rPr lang="it" sz="1800">
@@ -15180,6 +15248,18 @@
               <a:t> </a:t>
             </a:r>
             <a:r>
+              <a:rPr b="1" lang="it" sz="1800">
+                <a:solidFill>
+                  <a:srgbClr val="EE11FF"/>
+                </a:solidFill>
+                <a:latin typeface="Roboto Mono"/>
+                <a:ea typeface="Roboto Mono"/>
+                <a:cs typeface="Roboto Mono"/>
+                <a:sym typeface="Roboto Mono"/>
+              </a:rPr>
+              <a:t>*</a:t>
+            </a:r>
+            <a:r>
               <a:rPr lang="it" sz="1800">
                 <a:solidFill>
                   <a:srgbClr val="1AB1CD"/>
@@ -15189,7 +15269,7 @@
                 <a:cs typeface="Roboto Mono"/>
                 <a:sym typeface="Roboto Mono"/>
               </a:rPr>
-              <a:t>n</a:t>
+              <a:t>grafico</a:t>
             </a:r>
             <a:r>
               <a:rPr lang="it" sz="1800">
@@ -15222,16 +15302,88 @@
               <a:t> </a:t>
             </a:r>
             <a:r>
-              <a:rPr lang="it" sz="1800">
-                <a:solidFill>
-                  <a:srgbClr val="106040"/>
-                </a:solidFill>
-                <a:latin typeface="Roboto Mono"/>
-                <a:ea typeface="Roboto Mono"/>
-                <a:cs typeface="Roboto Mono"/>
-                <a:sym typeface="Roboto Mono"/>
-              </a:rPr>
-              <a:t>3</a:t>
+              <a:rPr b="1" lang="it" sz="1800">
+                <a:solidFill>
+                  <a:srgbClr val="700080"/>
+                </a:solidFill>
+                <a:latin typeface="Roboto Mono"/>
+                <a:ea typeface="Roboto Mono"/>
+                <a:cs typeface="Roboto Mono"/>
+                <a:sym typeface="Roboto Mono"/>
+              </a:rPr>
+              <a:t>new</a:t>
+            </a:r>
+            <a:r>
+              <a:rPr lang="it" sz="1800">
+                <a:latin typeface="Roboto Mono"/>
+                <a:ea typeface="Roboto Mono"/>
+                <a:cs typeface="Roboto Mono"/>
+                <a:sym typeface="Roboto Mono"/>
+              </a:rPr>
+              <a:t> </a:t>
+            </a:r>
+            <a:r>
+              <a:rPr lang="it" sz="1800">
+                <a:solidFill>
+                  <a:srgbClr val="1AB1CD"/>
+                </a:solidFill>
+                <a:latin typeface="Roboto Mono"/>
+                <a:ea typeface="Roboto Mono"/>
+                <a:cs typeface="Roboto Mono"/>
+                <a:sym typeface="Roboto Mono"/>
+              </a:rPr>
+              <a:t>TGraphErrors</a:t>
+            </a:r>
+            <a:r>
+              <a:rPr lang="it" sz="1800">
+                <a:latin typeface="Roboto Mono"/>
+                <a:ea typeface="Roboto Mono"/>
+                <a:cs typeface="Roboto Mono"/>
+                <a:sym typeface="Roboto Mono"/>
+              </a:rPr>
+              <a:t>(</a:t>
+            </a:r>
+            <a:r>
+              <a:rPr lang="it" sz="1800">
+                <a:solidFill>
+                  <a:srgbClr val="1AB1CD"/>
+                </a:solidFill>
+                <a:latin typeface="Roboto Mono"/>
+                <a:ea typeface="Roboto Mono"/>
+                <a:cs typeface="Roboto Mono"/>
+                <a:sym typeface="Roboto Mono"/>
+              </a:rPr>
+              <a:t>“file</a:t>
+            </a:r>
+            <a:r>
+              <a:rPr lang="it" sz="1800">
+                <a:latin typeface="Roboto Mono"/>
+                <a:ea typeface="Roboto Mono"/>
+                <a:cs typeface="Roboto Mono"/>
+                <a:sym typeface="Roboto Mono"/>
+              </a:rPr>
+              <a:t>.</a:t>
+            </a:r>
+            <a:r>
+              <a:rPr lang="it" sz="1800">
+                <a:solidFill>
+                  <a:srgbClr val="1AB1CD"/>
+                </a:solidFill>
+                <a:latin typeface="Roboto Mono"/>
+                <a:ea typeface="Roboto Mono"/>
+                <a:cs typeface="Roboto Mono"/>
+                <a:sym typeface="Roboto Mono"/>
+              </a:rPr>
+              <a:t>txt”</a:t>
+            </a:r>
+            <a:r>
+              <a:rPr lang="it" sz="1800">
+                <a:latin typeface="Roboto Mono"/>
+                <a:ea typeface="Roboto Mono"/>
+                <a:cs typeface="Roboto Mono"/>
+                <a:sym typeface="Roboto Mono"/>
+              </a:rPr>
+              <a:t>);</a:t>
             </a:r>
             <a:endParaRPr sz="1800">
               <a:latin typeface="Roboto Mono"/>
@@ -15255,150 +15407,12 @@
             </a:pPr>
             <a:r>
               <a:rPr lang="it" sz="1800">
-                <a:solidFill>
-                  <a:srgbClr val="008050"/>
-                </a:solidFill>
-                <a:latin typeface="Roboto Mono"/>
-                <a:ea typeface="Roboto Mono"/>
-                <a:cs typeface="Roboto Mono"/>
-                <a:sym typeface="Roboto Mono"/>
-              </a:rPr>
-              <a:t>double</a:t>
-            </a:r>
-            <a:r>
-              <a:rPr lang="it" sz="1800">
-                <a:latin typeface="Roboto Mono"/>
-                <a:ea typeface="Roboto Mono"/>
-                <a:cs typeface="Roboto Mono"/>
-                <a:sym typeface="Roboto Mono"/>
-              </a:rPr>
-              <a:t> </a:t>
-            </a:r>
-            <a:r>
-              <a:rPr lang="it" sz="1800">
-                <a:solidFill>
-                  <a:srgbClr val="1AB1CD"/>
-                </a:solidFill>
-                <a:latin typeface="Roboto Mono"/>
-                <a:ea typeface="Roboto Mono"/>
-                <a:cs typeface="Roboto Mono"/>
-                <a:sym typeface="Roboto Mono"/>
-              </a:rPr>
-              <a:t>x</a:t>
-            </a:r>
-            <a:r>
-              <a:rPr lang="it" sz="1800">
-                <a:latin typeface="Roboto Mono"/>
-                <a:ea typeface="Roboto Mono"/>
-                <a:cs typeface="Roboto Mono"/>
-                <a:sym typeface="Roboto Mono"/>
-              </a:rPr>
-              <a:t>[</a:t>
-            </a:r>
-            <a:r>
-              <a:rPr lang="it" sz="1800">
-                <a:solidFill>
-                  <a:srgbClr val="1AB1CD"/>
-                </a:solidFill>
-                <a:latin typeface="Roboto Mono"/>
-                <a:ea typeface="Roboto Mono"/>
-                <a:cs typeface="Roboto Mono"/>
-                <a:sym typeface="Roboto Mono"/>
-              </a:rPr>
-              <a:t>n</a:t>
-            </a:r>
-            <a:r>
-              <a:rPr lang="it" sz="1800">
-                <a:latin typeface="Roboto Mono"/>
-                <a:ea typeface="Roboto Mono"/>
-                <a:cs typeface="Roboto Mono"/>
-                <a:sym typeface="Roboto Mono"/>
-              </a:rPr>
-              <a:t>] </a:t>
-            </a:r>
-            <a:r>
-              <a:rPr b="1" lang="it" sz="1800">
-                <a:solidFill>
-                  <a:srgbClr val="EE11FF"/>
-                </a:solidFill>
-                <a:latin typeface="Roboto Mono"/>
-                <a:ea typeface="Roboto Mono"/>
-                <a:cs typeface="Roboto Mono"/>
-                <a:sym typeface="Roboto Mono"/>
-              </a:rPr>
-              <a:t>=</a:t>
-            </a:r>
-            <a:r>
-              <a:rPr lang="it" sz="1800">
-                <a:latin typeface="Roboto Mono"/>
-                <a:ea typeface="Roboto Mono"/>
-                <a:cs typeface="Roboto Mono"/>
-                <a:sym typeface="Roboto Mono"/>
-              </a:rPr>
-              <a:t> {</a:t>
-            </a:r>
-            <a:r>
-              <a:rPr lang="it" sz="1800">
-                <a:solidFill>
-                  <a:srgbClr val="106040"/>
-                </a:solidFill>
-                <a:latin typeface="Roboto Mono"/>
-                <a:ea typeface="Roboto Mono"/>
-                <a:cs typeface="Roboto Mono"/>
-                <a:sym typeface="Roboto Mono"/>
-              </a:rPr>
-              <a:t>0.1</a:t>
-            </a:r>
-            <a:r>
-              <a:rPr lang="it" sz="1800">
-                <a:latin typeface="Roboto Mono"/>
-                <a:ea typeface="Roboto Mono"/>
-                <a:cs typeface="Roboto Mono"/>
-                <a:sym typeface="Roboto Mono"/>
-              </a:rPr>
-              <a:t>,</a:t>
-            </a:r>
-            <a:r>
-              <a:rPr lang="it" sz="1800">
-                <a:solidFill>
-                  <a:srgbClr val="106040"/>
-                </a:solidFill>
-                <a:latin typeface="Roboto Mono"/>
-                <a:ea typeface="Roboto Mono"/>
-                <a:cs typeface="Roboto Mono"/>
-                <a:sym typeface="Roboto Mono"/>
-              </a:rPr>
-              <a:t>0.2</a:t>
-            </a:r>
-            <a:r>
-              <a:rPr lang="it" sz="1800">
-                <a:latin typeface="Roboto Mono"/>
-                <a:ea typeface="Roboto Mono"/>
-                <a:cs typeface="Roboto Mono"/>
-                <a:sym typeface="Roboto Mono"/>
-              </a:rPr>
-              <a:t>,</a:t>
-            </a:r>
-            <a:r>
-              <a:rPr lang="it" sz="1800">
-                <a:solidFill>
-                  <a:srgbClr val="106040"/>
-                </a:solidFill>
-                <a:latin typeface="Roboto Mono"/>
-                <a:ea typeface="Roboto Mono"/>
-                <a:cs typeface="Roboto Mono"/>
-                <a:sym typeface="Roboto Mono"/>
-              </a:rPr>
-              <a:t>0.3</a:t>
-            </a:r>
-            <a:r>
-              <a:rPr lang="it" sz="1800">
-                <a:latin typeface="Roboto Mono"/>
-                <a:ea typeface="Roboto Mono"/>
-                <a:cs typeface="Roboto Mono"/>
-                <a:sym typeface="Roboto Mono"/>
-              </a:rPr>
-              <a:t>};</a:t>
+                <a:latin typeface="Roboto Mono"/>
+                <a:ea typeface="Roboto Mono"/>
+                <a:cs typeface="Roboto Mono"/>
+                <a:sym typeface="Roboto Mono"/>
+              </a:rPr>
+              <a:t>//se manca errore x</a:t>
             </a:r>
             <a:endParaRPr sz="1800">
               <a:latin typeface="Roboto Mono"/>
@@ -15416,21 +15430,21 @@
                 <a:spcPts val="1200"/>
               </a:spcBef>
               <a:spcAft>
-                <a:spcPts val="0"/>
+                <a:spcPts val="1200"/>
               </a:spcAft>
               <a:buNone/>
             </a:pPr>
             <a:r>
               <a:rPr lang="it" sz="1800">
                 <a:solidFill>
-                  <a:srgbClr val="008050"/>
-                </a:solidFill>
-                <a:latin typeface="Roboto Mono"/>
-                <a:ea typeface="Roboto Mono"/>
-                <a:cs typeface="Roboto Mono"/>
-                <a:sym typeface="Roboto Mono"/>
-              </a:rPr>
-              <a:t>double</a:t>
+                  <a:srgbClr val="1AB1CD"/>
+                </a:solidFill>
+                <a:latin typeface="Roboto Mono"/>
+                <a:ea typeface="Roboto Mono"/>
+                <a:cs typeface="Roboto Mono"/>
+                <a:sym typeface="Roboto Mono"/>
+              </a:rPr>
+              <a:t>TGraphErrors</a:t>
             </a:r>
             <a:r>
               <a:rPr lang="it" sz="1800">
@@ -15442,6 +15456,18 @@
               <a:t> </a:t>
             </a:r>
             <a:r>
+              <a:rPr b="1" lang="it" sz="1800">
+                <a:solidFill>
+                  <a:srgbClr val="EE11FF"/>
+                </a:solidFill>
+                <a:latin typeface="Roboto Mono"/>
+                <a:ea typeface="Roboto Mono"/>
+                <a:cs typeface="Roboto Mono"/>
+                <a:sym typeface="Roboto Mono"/>
+              </a:rPr>
+              <a:t>*</a:t>
+            </a:r>
+            <a:r>
               <a:rPr lang="it" sz="1800">
                 <a:solidFill>
                   <a:srgbClr val="1AB1CD"/>
@@ -15451,16 +15477,58 @@
                 <a:cs typeface="Roboto Mono"/>
                 <a:sym typeface="Roboto Mono"/>
               </a:rPr>
-              <a:t>y</a:t>
-            </a:r>
-            <a:r>
-              <a:rPr lang="it" sz="1800">
-                <a:latin typeface="Roboto Mono"/>
-                <a:ea typeface="Roboto Mono"/>
-                <a:cs typeface="Roboto Mono"/>
-                <a:sym typeface="Roboto Mono"/>
-              </a:rPr>
-              <a:t>[</a:t>
+              <a:t>grafico</a:t>
+            </a:r>
+            <a:r>
+              <a:rPr lang="it" sz="1800">
+                <a:latin typeface="Roboto Mono"/>
+                <a:ea typeface="Roboto Mono"/>
+                <a:cs typeface="Roboto Mono"/>
+                <a:sym typeface="Roboto Mono"/>
+              </a:rPr>
+              <a:t> </a:t>
+            </a:r>
+            <a:r>
+              <a:rPr b="1" lang="it" sz="1800">
+                <a:solidFill>
+                  <a:srgbClr val="EE11FF"/>
+                </a:solidFill>
+                <a:latin typeface="Roboto Mono"/>
+                <a:ea typeface="Roboto Mono"/>
+                <a:cs typeface="Roboto Mono"/>
+                <a:sym typeface="Roboto Mono"/>
+              </a:rPr>
+              <a:t>=</a:t>
+            </a:r>
+            <a:r>
+              <a:rPr lang="it" sz="1800">
+                <a:latin typeface="Roboto Mono"/>
+                <a:ea typeface="Roboto Mono"/>
+                <a:cs typeface="Roboto Mono"/>
+                <a:sym typeface="Roboto Mono"/>
+              </a:rPr>
+              <a:t> </a:t>
+            </a:r>
+            <a:r>
+              <a:rPr b="1" lang="it" sz="1800">
+                <a:solidFill>
+                  <a:srgbClr val="700080"/>
+                </a:solidFill>
+                <a:latin typeface="Roboto Mono"/>
+                <a:ea typeface="Roboto Mono"/>
+                <a:cs typeface="Roboto Mono"/>
+                <a:sym typeface="Roboto Mono"/>
+              </a:rPr>
+              <a:t>new</a:t>
+            </a:r>
+            <a:r>
+              <a:rPr lang="it" sz="1800">
+                <a:latin typeface="Roboto Mono"/>
+                <a:ea typeface="Roboto Mono"/>
+                <a:cs typeface="Roboto Mono"/>
+                <a:sym typeface="Roboto Mono"/>
+              </a:rPr>
+              <a:t> </a:t>
             </a:r>
             <a:r>
               <a:rPr lang="it" sz="1800">
@@ -15472,100 +15540,58 @@
                 <a:cs typeface="Roboto Mono"/>
                 <a:sym typeface="Roboto Mono"/>
               </a:rPr>
-              <a:t>n</a:t>
-            </a:r>
-            <a:r>
-              <a:rPr lang="it" sz="1800">
-                <a:latin typeface="Roboto Mono"/>
-                <a:ea typeface="Roboto Mono"/>
-                <a:cs typeface="Roboto Mono"/>
-                <a:sym typeface="Roboto Mono"/>
-              </a:rPr>
-              <a:t>] </a:t>
-            </a:r>
-            <a:r>
-              <a:rPr b="1" lang="it" sz="1800">
-                <a:solidFill>
-                  <a:srgbClr val="EE11FF"/>
-                </a:solidFill>
-                <a:latin typeface="Roboto Mono"/>
-                <a:ea typeface="Roboto Mono"/>
-                <a:cs typeface="Roboto Mono"/>
-                <a:sym typeface="Roboto Mono"/>
-              </a:rPr>
-              <a:t>=</a:t>
-            </a:r>
-            <a:r>
-              <a:rPr lang="it" sz="1800">
-                <a:latin typeface="Roboto Mono"/>
-                <a:ea typeface="Roboto Mono"/>
-                <a:cs typeface="Roboto Mono"/>
-                <a:sym typeface="Roboto Mono"/>
-              </a:rPr>
-              <a:t> {</a:t>
-            </a:r>
-            <a:r>
-              <a:rPr lang="it" sz="1800">
-                <a:solidFill>
-                  <a:srgbClr val="106040"/>
-                </a:solidFill>
-                <a:latin typeface="Roboto Mono"/>
-                <a:ea typeface="Roboto Mono"/>
-                <a:cs typeface="Roboto Mono"/>
-                <a:sym typeface="Roboto Mono"/>
-              </a:rPr>
-              <a:t>0.2</a:t>
-            </a:r>
-            <a:r>
-              <a:rPr lang="it" sz="1800">
-                <a:latin typeface="Roboto Mono"/>
-                <a:ea typeface="Roboto Mono"/>
-                <a:cs typeface="Roboto Mono"/>
-                <a:sym typeface="Roboto Mono"/>
-              </a:rPr>
-              <a:t>,</a:t>
-            </a:r>
-            <a:r>
-              <a:rPr lang="it" sz="1800">
-                <a:solidFill>
-                  <a:srgbClr val="106040"/>
-                </a:solidFill>
-                <a:latin typeface="Roboto Mono"/>
-                <a:ea typeface="Roboto Mono"/>
-                <a:cs typeface="Roboto Mono"/>
-                <a:sym typeface="Roboto Mono"/>
-              </a:rPr>
-              <a:t>0.3</a:t>
-            </a:r>
-            <a:r>
-              <a:rPr lang="it" sz="1800">
-                <a:latin typeface="Roboto Mono"/>
-                <a:ea typeface="Roboto Mono"/>
-                <a:cs typeface="Roboto Mono"/>
-                <a:sym typeface="Roboto Mono"/>
-              </a:rPr>
-              <a:t>,</a:t>
-            </a:r>
-            <a:r>
-              <a:rPr lang="it" sz="1800">
-                <a:solidFill>
-                  <a:srgbClr val="106040"/>
-                </a:solidFill>
-                <a:latin typeface="Roboto Mono"/>
-                <a:ea typeface="Roboto Mono"/>
-                <a:cs typeface="Roboto Mono"/>
-                <a:sym typeface="Roboto Mono"/>
-              </a:rPr>
-              <a:t>0.6</a:t>
-            </a:r>
-            <a:r>
-              <a:rPr lang="it" sz="1800">
-                <a:latin typeface="Roboto Mono"/>
-                <a:ea typeface="Roboto Mono"/>
-                <a:cs typeface="Roboto Mono"/>
-                <a:sym typeface="Roboto Mono"/>
-              </a:rPr>
-              <a:t>};</a:t>
+              <a:t>TGraphErrors</a:t>
+            </a:r>
+            <a:r>
+              <a:rPr lang="it" sz="1800">
+                <a:latin typeface="Roboto Mono"/>
+                <a:ea typeface="Roboto Mono"/>
+                <a:cs typeface="Roboto Mono"/>
+                <a:sym typeface="Roboto Mono"/>
+              </a:rPr>
+              <a:t>(</a:t>
+            </a:r>
+            <a:r>
+              <a:rPr lang="it" sz="1800">
+                <a:solidFill>
+                  <a:srgbClr val="1AB1CD"/>
+                </a:solidFill>
+                <a:latin typeface="Roboto Mono"/>
+                <a:ea typeface="Roboto Mono"/>
+                <a:cs typeface="Roboto Mono"/>
+                <a:sym typeface="Roboto Mono"/>
+              </a:rPr>
+              <a:t>“file</a:t>
+            </a:r>
+            <a:r>
+              <a:rPr lang="it" sz="1800">
+                <a:latin typeface="Roboto Mono"/>
+                <a:ea typeface="Roboto Mono"/>
+                <a:cs typeface="Roboto Mono"/>
+                <a:sym typeface="Roboto Mono"/>
+              </a:rPr>
+              <a:t>.</a:t>
+            </a:r>
+            <a:r>
+              <a:rPr lang="it" sz="1800">
+                <a:solidFill>
+                  <a:srgbClr val="1AB1CD"/>
+                </a:solidFill>
+                <a:latin typeface="Roboto Mono"/>
+                <a:ea typeface="Roboto Mono"/>
+                <a:cs typeface="Roboto Mono"/>
+                <a:sym typeface="Roboto Mono"/>
+              </a:rPr>
+              <a:t>txt”,"%lg %lg %lg"</a:t>
+            </a:r>
+            <a:r>
+              <a:rPr lang="it" sz="1800">
+                <a:latin typeface="Roboto Mono"/>
+                <a:ea typeface="Roboto Mono"/>
+                <a:cs typeface="Roboto Mono"/>
+                <a:sym typeface="Roboto Mono"/>
+              </a:rPr>
+              <a:t>);</a:t>
             </a:r>
             <a:endParaRPr sz="1800">
               <a:latin typeface="Roboto Mono"/>
@@ -15573,503 +15599,6 @@
               <a:cs typeface="Roboto Mono"/>
               <a:sym typeface="Roboto Mono"/>
             </a:endParaRPr>
-          </a:p>
-          <a:p>
-            <a:pPr indent="0" lvl="0" marL="0" rtl="0" algn="l">
-              <a:lnSpc>
-                <a:spcPct val="115000"/>
-              </a:lnSpc>
-              <a:spcBef>
-                <a:spcPts val="1200"/>
-              </a:spcBef>
-              <a:spcAft>
-                <a:spcPts val="0"/>
-              </a:spcAft>
-              <a:buNone/>
-            </a:pPr>
-            <a:r>
-              <a:rPr b="1" lang="it" sz="1800">
-                <a:solidFill>
-                  <a:srgbClr val="EE11FF"/>
-                </a:solidFill>
-                <a:latin typeface="Roboto Mono"/>
-                <a:ea typeface="Roboto Mono"/>
-                <a:cs typeface="Roboto Mono"/>
-                <a:sym typeface="Roboto Mono"/>
-              </a:rPr>
-              <a:t>//</a:t>
-            </a:r>
-            <a:r>
-              <a:rPr lang="it" sz="1800">
-                <a:solidFill>
-                  <a:srgbClr val="1AB1CD"/>
-                </a:solidFill>
-                <a:latin typeface="Roboto Mono"/>
-                <a:ea typeface="Roboto Mono"/>
-                <a:cs typeface="Roboto Mono"/>
-                <a:sym typeface="Roboto Mono"/>
-              </a:rPr>
-              <a:t>x_err</a:t>
-            </a:r>
-            <a:r>
-              <a:rPr lang="it" sz="1800">
-                <a:latin typeface="Roboto Mono"/>
-                <a:ea typeface="Roboto Mono"/>
-                <a:cs typeface="Roboto Mono"/>
-                <a:sym typeface="Roboto Mono"/>
-              </a:rPr>
-              <a:t> </a:t>
-            </a:r>
-            <a:r>
-              <a:rPr lang="it" sz="1800">
-                <a:solidFill>
-                  <a:srgbClr val="1AB1CD"/>
-                </a:solidFill>
-                <a:latin typeface="Roboto Mono"/>
-                <a:ea typeface="Roboto Mono"/>
-                <a:cs typeface="Roboto Mono"/>
-                <a:sym typeface="Roboto Mono"/>
-              </a:rPr>
-              <a:t>nullo</a:t>
-            </a:r>
-            <a:endParaRPr sz="1800">
-              <a:latin typeface="Roboto Mono"/>
-              <a:ea typeface="Roboto Mono"/>
-              <a:cs typeface="Roboto Mono"/>
-              <a:sym typeface="Roboto Mono"/>
-            </a:endParaRPr>
-          </a:p>
-          <a:p>
-            <a:pPr indent="0" lvl="0" marL="0" rtl="0" algn="l">
-              <a:lnSpc>
-                <a:spcPct val="115000"/>
-              </a:lnSpc>
-              <a:spcBef>
-                <a:spcPts val="1200"/>
-              </a:spcBef>
-              <a:spcAft>
-                <a:spcPts val="0"/>
-              </a:spcAft>
-              <a:buNone/>
-            </a:pPr>
-            <a:r>
-              <a:rPr lang="it" sz="1800">
-                <a:solidFill>
-                  <a:srgbClr val="008050"/>
-                </a:solidFill>
-                <a:latin typeface="Roboto Mono"/>
-                <a:ea typeface="Roboto Mono"/>
-                <a:cs typeface="Roboto Mono"/>
-                <a:sym typeface="Roboto Mono"/>
-              </a:rPr>
-              <a:t>double</a:t>
-            </a:r>
-            <a:r>
-              <a:rPr lang="it" sz="1800">
-                <a:latin typeface="Roboto Mono"/>
-                <a:ea typeface="Roboto Mono"/>
-                <a:cs typeface="Roboto Mono"/>
-                <a:sym typeface="Roboto Mono"/>
-              </a:rPr>
-              <a:t> </a:t>
-            </a:r>
-            <a:r>
-              <a:rPr lang="it" sz="1800">
-                <a:solidFill>
-                  <a:srgbClr val="1AB1CD"/>
-                </a:solidFill>
-                <a:latin typeface="Roboto Mono"/>
-                <a:ea typeface="Roboto Mono"/>
-                <a:cs typeface="Roboto Mono"/>
-                <a:sym typeface="Roboto Mono"/>
-              </a:rPr>
-              <a:t>y_err</a:t>
-            </a:r>
-            <a:r>
-              <a:rPr lang="it" sz="1800">
-                <a:latin typeface="Roboto Mono"/>
-                <a:ea typeface="Roboto Mono"/>
-                <a:cs typeface="Roboto Mono"/>
-                <a:sym typeface="Roboto Mono"/>
-              </a:rPr>
-              <a:t>[</a:t>
-            </a:r>
-            <a:r>
-              <a:rPr lang="it" sz="1800">
-                <a:solidFill>
-                  <a:srgbClr val="1AB1CD"/>
-                </a:solidFill>
-                <a:latin typeface="Roboto Mono"/>
-                <a:ea typeface="Roboto Mono"/>
-                <a:cs typeface="Roboto Mono"/>
-                <a:sym typeface="Roboto Mono"/>
-              </a:rPr>
-              <a:t>n</a:t>
-            </a:r>
-            <a:r>
-              <a:rPr lang="it" sz="1800">
-                <a:latin typeface="Roboto Mono"/>
-                <a:ea typeface="Roboto Mono"/>
-                <a:cs typeface="Roboto Mono"/>
-                <a:sym typeface="Roboto Mono"/>
-              </a:rPr>
-              <a:t>] </a:t>
-            </a:r>
-            <a:r>
-              <a:rPr b="1" lang="it" sz="1800">
-                <a:solidFill>
-                  <a:srgbClr val="EE11FF"/>
-                </a:solidFill>
-                <a:latin typeface="Roboto Mono"/>
-                <a:ea typeface="Roboto Mono"/>
-                <a:cs typeface="Roboto Mono"/>
-                <a:sym typeface="Roboto Mono"/>
-              </a:rPr>
-              <a:t>=</a:t>
-            </a:r>
-            <a:r>
-              <a:rPr lang="it" sz="1800">
-                <a:latin typeface="Roboto Mono"/>
-                <a:ea typeface="Roboto Mono"/>
-                <a:cs typeface="Roboto Mono"/>
-                <a:sym typeface="Roboto Mono"/>
-              </a:rPr>
-              <a:t> {</a:t>
-            </a:r>
-            <a:r>
-              <a:rPr lang="it" sz="1800">
-                <a:solidFill>
-                  <a:srgbClr val="106040"/>
-                </a:solidFill>
-                <a:latin typeface="Roboto Mono"/>
-                <a:ea typeface="Roboto Mono"/>
-                <a:cs typeface="Roboto Mono"/>
-                <a:sym typeface="Roboto Mono"/>
-              </a:rPr>
-              <a:t>0.008</a:t>
-            </a:r>
-            <a:r>
-              <a:rPr lang="it" sz="1800">
-                <a:latin typeface="Roboto Mono"/>
-                <a:ea typeface="Roboto Mono"/>
-                <a:cs typeface="Roboto Mono"/>
-                <a:sym typeface="Roboto Mono"/>
-              </a:rPr>
-              <a:t>,</a:t>
-            </a:r>
-            <a:r>
-              <a:rPr lang="it" sz="1800">
-                <a:solidFill>
-                  <a:srgbClr val="106040"/>
-                </a:solidFill>
-                <a:latin typeface="Roboto Mono"/>
-                <a:ea typeface="Roboto Mono"/>
-                <a:cs typeface="Roboto Mono"/>
-                <a:sym typeface="Roboto Mono"/>
-              </a:rPr>
-              <a:t>0.008</a:t>
-            </a:r>
-            <a:r>
-              <a:rPr lang="it" sz="1800">
-                <a:latin typeface="Roboto Mono"/>
-                <a:ea typeface="Roboto Mono"/>
-                <a:cs typeface="Roboto Mono"/>
-                <a:sym typeface="Roboto Mono"/>
-              </a:rPr>
-              <a:t>,</a:t>
-            </a:r>
-            <a:r>
-              <a:rPr lang="it" sz="1800">
-                <a:solidFill>
-                  <a:srgbClr val="106040"/>
-                </a:solidFill>
-                <a:latin typeface="Roboto Mono"/>
-                <a:ea typeface="Roboto Mono"/>
-                <a:cs typeface="Roboto Mono"/>
-                <a:sym typeface="Roboto Mono"/>
-              </a:rPr>
-              <a:t>0.008</a:t>
-            </a:r>
-            <a:r>
-              <a:rPr lang="it" sz="1800">
-                <a:latin typeface="Roboto Mono"/>
-                <a:ea typeface="Roboto Mono"/>
-                <a:cs typeface="Roboto Mono"/>
-                <a:sym typeface="Roboto Mono"/>
-              </a:rPr>
-              <a:t>};</a:t>
-            </a:r>
-            <a:endParaRPr sz="1800">
-              <a:latin typeface="Roboto Mono"/>
-              <a:ea typeface="Roboto Mono"/>
-              <a:cs typeface="Roboto Mono"/>
-              <a:sym typeface="Roboto Mono"/>
-            </a:endParaRPr>
-          </a:p>
-          <a:p>
-            <a:pPr indent="0" lvl="0" marL="0" rtl="0" algn="l">
-              <a:lnSpc>
-                <a:spcPct val="115000"/>
-              </a:lnSpc>
-              <a:spcBef>
-                <a:spcPts val="1200"/>
-              </a:spcBef>
-              <a:spcAft>
-                <a:spcPts val="1200"/>
-              </a:spcAft>
-              <a:buNone/>
-            </a:pPr>
-            <a:r>
-              <a:rPr lang="it" sz="1800">
-                <a:solidFill>
-                  <a:srgbClr val="1AB1CD"/>
-                </a:solidFill>
-                <a:latin typeface="Roboto Mono"/>
-                <a:ea typeface="Roboto Mono"/>
-                <a:cs typeface="Roboto Mono"/>
-                <a:sym typeface="Roboto Mono"/>
-              </a:rPr>
-              <a:t>TGraph</a:t>
-            </a:r>
-            <a:r>
-              <a:rPr b="1" lang="it" sz="1800">
-                <a:solidFill>
-                  <a:srgbClr val="EE11FF"/>
-                </a:solidFill>
-                <a:latin typeface="Roboto Mono"/>
-                <a:ea typeface="Roboto Mono"/>
-                <a:cs typeface="Roboto Mono"/>
-                <a:sym typeface="Roboto Mono"/>
-              </a:rPr>
-              <a:t>*</a:t>
-            </a:r>
-            <a:r>
-              <a:rPr lang="it" sz="1800">
-                <a:latin typeface="Roboto Mono"/>
-                <a:ea typeface="Roboto Mono"/>
-                <a:cs typeface="Roboto Mono"/>
-                <a:sym typeface="Roboto Mono"/>
-              </a:rPr>
-              <a:t> </a:t>
-            </a:r>
-            <a:r>
-              <a:rPr lang="it" sz="1800">
-                <a:solidFill>
-                  <a:srgbClr val="1AB1CD"/>
-                </a:solidFill>
-                <a:latin typeface="Roboto Mono"/>
-                <a:ea typeface="Roboto Mono"/>
-                <a:cs typeface="Roboto Mono"/>
-                <a:sym typeface="Roboto Mono"/>
-              </a:rPr>
-              <a:t>gr</a:t>
-            </a:r>
-            <a:r>
-              <a:rPr lang="it" sz="1800">
-                <a:latin typeface="Roboto Mono"/>
-                <a:ea typeface="Roboto Mono"/>
-                <a:cs typeface="Roboto Mono"/>
-                <a:sym typeface="Roboto Mono"/>
-              </a:rPr>
-              <a:t> </a:t>
-            </a:r>
-            <a:r>
-              <a:rPr b="1" lang="it" sz="1800">
-                <a:solidFill>
-                  <a:srgbClr val="EE11FF"/>
-                </a:solidFill>
-                <a:latin typeface="Roboto Mono"/>
-                <a:ea typeface="Roboto Mono"/>
-                <a:cs typeface="Roboto Mono"/>
-                <a:sym typeface="Roboto Mono"/>
-              </a:rPr>
-              <a:t>=</a:t>
-            </a:r>
-            <a:r>
-              <a:rPr lang="it" sz="1800">
-                <a:latin typeface="Roboto Mono"/>
-                <a:ea typeface="Roboto Mono"/>
-                <a:cs typeface="Roboto Mono"/>
-                <a:sym typeface="Roboto Mono"/>
-              </a:rPr>
-              <a:t> </a:t>
-            </a:r>
-            <a:r>
-              <a:rPr b="1" lang="it" sz="1800">
-                <a:solidFill>
-                  <a:srgbClr val="700080"/>
-                </a:solidFill>
-                <a:latin typeface="Roboto Mono"/>
-                <a:ea typeface="Roboto Mono"/>
-                <a:cs typeface="Roboto Mono"/>
-                <a:sym typeface="Roboto Mono"/>
-              </a:rPr>
-              <a:t>new</a:t>
-            </a:r>
-            <a:r>
-              <a:rPr lang="it" sz="1800">
-                <a:latin typeface="Roboto Mono"/>
-                <a:ea typeface="Roboto Mono"/>
-                <a:cs typeface="Roboto Mono"/>
-                <a:sym typeface="Roboto Mono"/>
-              </a:rPr>
-              <a:t> </a:t>
-            </a:r>
-            <a:r>
-              <a:rPr lang="it" sz="1800">
-                <a:solidFill>
-                  <a:srgbClr val="1AB1CD"/>
-                </a:solidFill>
-                <a:latin typeface="Roboto Mono"/>
-                <a:ea typeface="Roboto Mono"/>
-                <a:cs typeface="Roboto Mono"/>
-                <a:sym typeface="Roboto Mono"/>
-              </a:rPr>
-              <a:t>TGraph</a:t>
-            </a:r>
-            <a:r>
-              <a:rPr lang="it" sz="1800">
-                <a:latin typeface="Roboto Mono"/>
-                <a:ea typeface="Roboto Mono"/>
-                <a:cs typeface="Roboto Mono"/>
-                <a:sym typeface="Roboto Mono"/>
-              </a:rPr>
-              <a:t>(</a:t>
-            </a:r>
-            <a:r>
-              <a:rPr lang="it" sz="1800">
-                <a:solidFill>
-                  <a:srgbClr val="1AB1CD"/>
-                </a:solidFill>
-                <a:latin typeface="Roboto Mono"/>
-                <a:ea typeface="Roboto Mono"/>
-                <a:cs typeface="Roboto Mono"/>
-                <a:sym typeface="Roboto Mono"/>
-              </a:rPr>
-              <a:t>n</a:t>
-            </a:r>
-            <a:r>
-              <a:rPr lang="it" sz="1800">
-                <a:latin typeface="Roboto Mono"/>
-                <a:ea typeface="Roboto Mono"/>
-                <a:cs typeface="Roboto Mono"/>
-                <a:sym typeface="Roboto Mono"/>
-              </a:rPr>
-              <a:t>, </a:t>
-            </a:r>
-            <a:r>
-              <a:rPr lang="it" sz="1800">
-                <a:solidFill>
-                  <a:srgbClr val="1AB1CD"/>
-                </a:solidFill>
-                <a:latin typeface="Roboto Mono"/>
-                <a:ea typeface="Roboto Mono"/>
-                <a:cs typeface="Roboto Mono"/>
-                <a:sym typeface="Roboto Mono"/>
-              </a:rPr>
-              <a:t>x</a:t>
-            </a:r>
-            <a:r>
-              <a:rPr lang="it" sz="1800">
-                <a:latin typeface="Roboto Mono"/>
-                <a:ea typeface="Roboto Mono"/>
-                <a:cs typeface="Roboto Mono"/>
-                <a:sym typeface="Roboto Mono"/>
-              </a:rPr>
-              <a:t>, </a:t>
-            </a:r>
-            <a:r>
-              <a:rPr lang="it" sz="1800">
-                <a:solidFill>
-                  <a:srgbClr val="1AB1CD"/>
-                </a:solidFill>
-                <a:latin typeface="Roboto Mono"/>
-                <a:ea typeface="Roboto Mono"/>
-                <a:cs typeface="Roboto Mono"/>
-                <a:sym typeface="Roboto Mono"/>
-              </a:rPr>
-              <a:t>y,nullptr,y_err</a:t>
-            </a:r>
-            <a:r>
-              <a:rPr lang="it" sz="1800">
-                <a:latin typeface="Roboto Mono"/>
-                <a:ea typeface="Roboto Mono"/>
-                <a:cs typeface="Roboto Mono"/>
-                <a:sym typeface="Roboto Mono"/>
-              </a:rPr>
-              <a:t>); </a:t>
-            </a:r>
-            <a:endParaRPr sz="1800">
-              <a:latin typeface="Roboto Mono"/>
-              <a:ea typeface="Roboto Mono"/>
-              <a:cs typeface="Roboto Mono"/>
-              <a:sym typeface="Roboto Mono"/>
-            </a:endParaRPr>
-          </a:p>
-        </p:txBody>
-      </p:sp>
-    </p:spTree>
-  </p:cSld>
-  <p:clrMapOvr>
-    <a:masterClrMapping/>
-  </p:clrMapOvr>
-</p:sld>
-</file>
-
-<file path=ppt/slides/slide8.xml><?xml version="1.0" encoding="utf-8"?>
-<p:sld xmlns:a="http://schemas.openxmlformats.org/drawingml/2006/main" xmlns:r="http://schemas.openxmlformats.org/officeDocument/2006/relationships" xmlns:mc="http://schemas.openxmlformats.org/markup-compatibility/2006" xmlns:mv="urn:schemas-microsoft-com:mac:vml" xmlns:p="http://schemas.openxmlformats.org/presentationml/2006/main" xmlns:c="http://schemas.openxmlformats.org/drawingml/2006/chart" xmlns:dgm="http://schemas.openxmlformats.org/drawingml/2006/diagram" xmlns:o="urn:schemas-microsoft-com:office:office" xmlns:v="urn:schemas-microsoft-com:vml" xmlns:pvml="urn:schemas-microsoft-com:office:powerpoint" xmlns:com="http://schemas.openxmlformats.org/drawingml/2006/compatibility" xmlns:p14="http://schemas.microsoft.com/office/powerpoint/2010/main" xmlns:p15="http://schemas.microsoft.com/office/powerpoint/2012/main" xmlns:ahyp="http://schemas.microsoft.com/office/drawing/2018/hyperlinkcolor">
-  <p:cSld>
-    <p:spTree>
-      <p:nvGrpSpPr>
-        <p:cNvPr id="99" name="Shape 99"/>
-        <p:cNvGrpSpPr/>
-        <p:nvPr/>
-      </p:nvGrpSpPr>
-      <p:grpSpPr>
-        <a:xfrm>
-          <a:off x="0" y="0"/>
-          <a:ext cx="0" cy="0"/>
-          <a:chOff x="0" y="0"/>
-          <a:chExt cx="0" cy="0"/>
-        </a:xfrm>
-      </p:grpSpPr>
-      <p:sp>
-        <p:nvSpPr>
-          <p:cNvPr id="100" name="Google Shape;100;p20"/>
-          <p:cNvSpPr txBox="1"/>
-          <p:nvPr>
-            <p:ph type="title"/>
-          </p:nvPr>
-        </p:nvSpPr>
-        <p:spPr>
-          <a:xfrm>
-            <a:off x="311700" y="2150850"/>
-            <a:ext cx="8520600" cy="841800"/>
-          </a:xfrm>
-          <a:prstGeom prst="rect">
-            <a:avLst/>
-          </a:prstGeom>
-        </p:spPr>
-        <p:txBody>
-          <a:bodyPr anchorCtr="0" anchor="ctr" bIns="91425" lIns="91425" spcFirstLastPara="1" rIns="91425" wrap="square" tIns="91425">
-            <a:normAutofit/>
-          </a:bodyPr>
-          <a:lstStyle/>
-          <a:p>
-            <a:pPr indent="0" lvl="0" marL="0" rtl="0" algn="ctr">
-              <a:spcBef>
-                <a:spcPts val="0"/>
-              </a:spcBef>
-              <a:spcAft>
-                <a:spcPts val="0"/>
-              </a:spcAft>
-              <a:buNone/>
-            </a:pPr>
-            <a:r>
-              <a:rPr lang="it"/>
-              <a:t>Grafici con incertezze</a:t>
-            </a:r>
-            <a:endParaRPr/>
           </a:p>
         </p:txBody>
       </p:sp>
@@ -16132,22 +15661,7 @@
             </a:pPr>
             <a:r>
               <a:rPr lang="it"/>
-              <a:t>Classe TGraphErrors</a:t>
-            </a:r>
-            <a:endParaRPr/>
-          </a:p>
-          <a:p>
-            <a:pPr indent="0" lvl="0" marL="0" rtl="0" algn="l">
-              <a:spcBef>
-                <a:spcPts val="0"/>
-              </a:spcBef>
-              <a:spcAft>
-                <a:spcPts val="0"/>
-              </a:spcAft>
-              <a:buNone/>
-            </a:pPr>
-            <a:r>
-              <a:t/>
+              <a:t>Caricare dati via array</a:t>
             </a:r>
             <a:endParaRPr/>
           </a:p>
@@ -16164,7 +15678,7 @@
         <p:spPr>
           <a:xfrm>
             <a:off x="311700" y="1152475"/>
-            <a:ext cx="8520600" cy="3416400"/>
+            <a:ext cx="8520600" cy="572700"/>
           </a:xfrm>
           <a:prstGeom prst="rect">
             <a:avLst/>
@@ -16181,43 +15695,13 @@
                 <a:spcPts val="0"/>
               </a:spcBef>
               <a:spcAft>
-                <a:spcPts val="0"/>
+                <a:spcPts val="1200"/>
               </a:spcAft>
               <a:buNone/>
             </a:pPr>
             <a:r>
               <a:rPr lang="it"/>
-              <a:t>deriva dalla classe TGraph ed eredita tutti i metodi (come Draw e Fit)</a:t>
-            </a:r>
-            <a:endParaRPr/>
-          </a:p>
-          <a:p>
-            <a:pPr indent="0" lvl="0" marL="0" rtl="0" algn="l">
-              <a:spcBef>
-                <a:spcPts val="1200"/>
-              </a:spcBef>
-              <a:spcAft>
-                <a:spcPts val="0"/>
-              </a:spcAft>
-              <a:buNone/>
-            </a:pPr>
-            <a:r>
-              <a:t/>
-            </a:r>
-            <a:endParaRPr/>
-          </a:p>
-          <a:p>
-            <a:pPr indent="0" lvl="0" marL="0" rtl="0" algn="l">
-              <a:spcBef>
-                <a:spcPts val="1200"/>
-              </a:spcBef>
-              <a:spcAft>
-                <a:spcPts val="1200"/>
-              </a:spcAft>
-              <a:buNone/>
-            </a:pPr>
-            <a:r>
-              <a:t/>
+              <a:t>se l’errore è nullo, basta usare nullptr</a:t>
             </a:r>
             <a:endParaRPr/>
           </a:p>
@@ -16231,8 +15715,8 @@
         </p:nvSpPr>
         <p:spPr>
           <a:xfrm>
-            <a:off x="311700" y="2200675"/>
-            <a:ext cx="8427300" cy="1795200"/>
+            <a:off x="1102650" y="1859925"/>
+            <a:ext cx="6938700" cy="2894400"/>
           </a:xfrm>
           <a:prstGeom prst="rect">
             <a:avLst/>
@@ -16259,7 +15743,7 @@
         </p:spPr>
         <p:txBody>
           <a:bodyPr anchorCtr="0" anchor="ctr" bIns="144000" lIns="144000" spcFirstLastPara="1" rIns="144000" wrap="square" tIns="108000">
-            <a:spAutoFit/>
+            <a:noAutofit/>
           </a:bodyPr>
           <a:lstStyle/>
           <a:p>
@@ -16278,6 +15762,27 @@
             <a:r>
               <a:rPr lang="it" sz="1800">
                 <a:solidFill>
+                  <a:srgbClr val="008050"/>
+                </a:solidFill>
+                <a:latin typeface="Roboto Mono"/>
+                <a:ea typeface="Roboto Mono"/>
+                <a:cs typeface="Roboto Mono"/>
+                <a:sym typeface="Roboto Mono"/>
+              </a:rPr>
+              <a:t>int</a:t>
+            </a:r>
+            <a:r>
+              <a:rPr lang="it" sz="1800">
+                <a:latin typeface="Roboto Mono"/>
+                <a:ea typeface="Roboto Mono"/>
+                <a:cs typeface="Roboto Mono"/>
+                <a:sym typeface="Roboto Mono"/>
+              </a:rPr>
+              <a:t> </a:t>
+            </a:r>
+            <a:r>
+              <a:rPr lang="it" sz="1800">
+                <a:solidFill>
                   <a:srgbClr val="1AB1CD"/>
                 </a:solidFill>
                 <a:latin typeface="Roboto Mono"/>
@@ -16285,7 +15790,7 @@
                 <a:cs typeface="Roboto Mono"/>
                 <a:sym typeface="Roboto Mono"/>
               </a:rPr>
-              <a:t>TGraphErrors</a:t>
+              <a:t>n</a:t>
             </a:r>
             <a:r>
               <a:rPr lang="it" sz="1800">
@@ -16306,19 +15811,7 @@
                 <a:cs typeface="Roboto Mono"/>
                 <a:sym typeface="Roboto Mono"/>
               </a:rPr>
-              <a:t>*</a:t>
-            </a:r>
-            <a:r>
-              <a:rPr lang="it" sz="1800">
-                <a:solidFill>
-                  <a:srgbClr val="1AB1CD"/>
-                </a:solidFill>
-                <a:latin typeface="Roboto Mono"/>
-                <a:ea typeface="Roboto Mono"/>
-                <a:cs typeface="Roboto Mono"/>
-                <a:sym typeface="Roboto Mono"/>
-              </a:rPr>
-              <a:t>grafico</a:t>
+              <a:t>=</a:t>
             </a:r>
             <a:r>
               <a:rPr lang="it" sz="1800">
@@ -16330,109 +15823,16 @@
               <a:t> </a:t>
             </a:r>
             <a:r>
-              <a:rPr b="1" lang="it" sz="1800">
-                <a:solidFill>
-                  <a:srgbClr val="EE11FF"/>
-                </a:solidFill>
-                <a:latin typeface="Roboto Mono"/>
-                <a:ea typeface="Roboto Mono"/>
-                <a:cs typeface="Roboto Mono"/>
-                <a:sym typeface="Roboto Mono"/>
-              </a:rPr>
-              <a:t>=</a:t>
-            </a:r>
-            <a:r>
-              <a:rPr lang="it" sz="1800">
-                <a:latin typeface="Roboto Mono"/>
-                <a:ea typeface="Roboto Mono"/>
-                <a:cs typeface="Roboto Mono"/>
-                <a:sym typeface="Roboto Mono"/>
-              </a:rPr>
-              <a:t> </a:t>
-            </a:r>
-            <a:r>
-              <a:rPr b="1" lang="it" sz="1800">
-                <a:solidFill>
-                  <a:srgbClr val="700080"/>
-                </a:solidFill>
-                <a:latin typeface="Roboto Mono"/>
-                <a:ea typeface="Roboto Mono"/>
-                <a:cs typeface="Roboto Mono"/>
-                <a:sym typeface="Roboto Mono"/>
-              </a:rPr>
-              <a:t>new</a:t>
-            </a:r>
-            <a:r>
-              <a:rPr lang="it" sz="1800">
-                <a:latin typeface="Roboto Mono"/>
-                <a:ea typeface="Roboto Mono"/>
-                <a:cs typeface="Roboto Mono"/>
-                <a:sym typeface="Roboto Mono"/>
-              </a:rPr>
-              <a:t> </a:t>
-            </a:r>
-            <a:r>
-              <a:rPr lang="it" sz="1800">
-                <a:solidFill>
-                  <a:srgbClr val="1AB1CD"/>
-                </a:solidFill>
-                <a:latin typeface="Roboto Mono"/>
-                <a:ea typeface="Roboto Mono"/>
-                <a:cs typeface="Roboto Mono"/>
-                <a:sym typeface="Roboto Mono"/>
-              </a:rPr>
-              <a:t>TGraphErrors</a:t>
-            </a:r>
-            <a:r>
-              <a:rPr lang="it" sz="1800">
-                <a:latin typeface="Roboto Mono"/>
-                <a:ea typeface="Roboto Mono"/>
-                <a:cs typeface="Roboto Mono"/>
-                <a:sym typeface="Roboto Mono"/>
-              </a:rPr>
-              <a:t>(</a:t>
-            </a:r>
-            <a:r>
-              <a:rPr lang="it" sz="1800">
-                <a:solidFill>
-                  <a:srgbClr val="1AB1CD"/>
-                </a:solidFill>
-                <a:latin typeface="Roboto Mono"/>
-                <a:ea typeface="Roboto Mono"/>
-                <a:cs typeface="Roboto Mono"/>
-                <a:sym typeface="Roboto Mono"/>
-              </a:rPr>
-              <a:t>“file</a:t>
-            </a:r>
-            <a:r>
-              <a:rPr lang="it" sz="1800">
-                <a:latin typeface="Roboto Mono"/>
-                <a:ea typeface="Roboto Mono"/>
-                <a:cs typeface="Roboto Mono"/>
-                <a:sym typeface="Roboto Mono"/>
-              </a:rPr>
-              <a:t>.</a:t>
-            </a:r>
-            <a:r>
-              <a:rPr lang="it" sz="1800">
-                <a:solidFill>
-                  <a:srgbClr val="1AB1CD"/>
-                </a:solidFill>
-                <a:latin typeface="Roboto Mono"/>
-                <a:ea typeface="Roboto Mono"/>
-                <a:cs typeface="Roboto Mono"/>
-                <a:sym typeface="Roboto Mono"/>
-              </a:rPr>
-              <a:t>txt”</a:t>
-            </a:r>
-            <a:r>
-              <a:rPr lang="it" sz="1800">
-                <a:latin typeface="Roboto Mono"/>
-                <a:ea typeface="Roboto Mono"/>
-                <a:cs typeface="Roboto Mono"/>
-                <a:sym typeface="Roboto Mono"/>
-              </a:rPr>
-              <a:t>);</a:t>
+              <a:rPr lang="it" sz="1800">
+                <a:solidFill>
+                  <a:srgbClr val="106040"/>
+                </a:solidFill>
+                <a:latin typeface="Roboto Mono"/>
+                <a:ea typeface="Roboto Mono"/>
+                <a:cs typeface="Roboto Mono"/>
+                <a:sym typeface="Roboto Mono"/>
+              </a:rPr>
+              <a:t>3</a:t>
             </a:r>
             <a:endParaRPr sz="1800">
               <a:latin typeface="Roboto Mono"/>
@@ -16456,12 +15856,129 @@
             </a:pPr>
             <a:r>
               <a:rPr lang="it" sz="1800">
-                <a:latin typeface="Roboto Mono"/>
-                <a:ea typeface="Roboto Mono"/>
-                <a:cs typeface="Roboto Mono"/>
-                <a:sym typeface="Roboto Mono"/>
-              </a:rPr>
-              <a:t>//se manca errore x</a:t>
+                <a:solidFill>
+                  <a:srgbClr val="008050"/>
+                </a:solidFill>
+                <a:latin typeface="Roboto Mono"/>
+                <a:ea typeface="Roboto Mono"/>
+                <a:cs typeface="Roboto Mono"/>
+                <a:sym typeface="Roboto Mono"/>
+              </a:rPr>
+              <a:t>double</a:t>
+            </a:r>
+            <a:r>
+              <a:rPr lang="it" sz="1800">
+                <a:latin typeface="Roboto Mono"/>
+                <a:ea typeface="Roboto Mono"/>
+                <a:cs typeface="Roboto Mono"/>
+                <a:sym typeface="Roboto Mono"/>
+              </a:rPr>
+              <a:t> </a:t>
+            </a:r>
+            <a:r>
+              <a:rPr lang="it" sz="1800">
+                <a:solidFill>
+                  <a:srgbClr val="1AB1CD"/>
+                </a:solidFill>
+                <a:latin typeface="Roboto Mono"/>
+                <a:ea typeface="Roboto Mono"/>
+                <a:cs typeface="Roboto Mono"/>
+                <a:sym typeface="Roboto Mono"/>
+              </a:rPr>
+              <a:t>x</a:t>
+            </a:r>
+            <a:r>
+              <a:rPr lang="it" sz="1800">
+                <a:latin typeface="Roboto Mono"/>
+                <a:ea typeface="Roboto Mono"/>
+                <a:cs typeface="Roboto Mono"/>
+                <a:sym typeface="Roboto Mono"/>
+              </a:rPr>
+              <a:t>[] </a:t>
+            </a:r>
+            <a:r>
+              <a:rPr b="1" lang="it" sz="1800">
+                <a:solidFill>
+                  <a:srgbClr val="EE11FF"/>
+                </a:solidFill>
+                <a:latin typeface="Roboto Mono"/>
+                <a:ea typeface="Roboto Mono"/>
+                <a:cs typeface="Roboto Mono"/>
+                <a:sym typeface="Roboto Mono"/>
+              </a:rPr>
+              <a:t>=</a:t>
+            </a:r>
+            <a:r>
+              <a:rPr lang="it" sz="1800">
+                <a:latin typeface="Roboto Mono"/>
+                <a:ea typeface="Roboto Mono"/>
+                <a:cs typeface="Roboto Mono"/>
+                <a:sym typeface="Roboto Mono"/>
+              </a:rPr>
+              <a:t> {</a:t>
+            </a:r>
+            <a:r>
+              <a:rPr lang="it" sz="1800">
+                <a:solidFill>
+                  <a:srgbClr val="106040"/>
+                </a:solidFill>
+                <a:latin typeface="Roboto Mono"/>
+                <a:ea typeface="Roboto Mono"/>
+                <a:cs typeface="Roboto Mono"/>
+                <a:sym typeface="Roboto Mono"/>
+              </a:rPr>
+              <a:t>0.1</a:t>
+            </a:r>
+            <a:r>
+              <a:rPr lang="it" sz="1800">
+                <a:latin typeface="Roboto Mono"/>
+                <a:ea typeface="Roboto Mono"/>
+                <a:cs typeface="Roboto Mono"/>
+                <a:sym typeface="Roboto Mono"/>
+              </a:rPr>
+              <a:t>,</a:t>
+            </a:r>
+            <a:r>
+              <a:rPr lang="it" sz="1800">
+                <a:solidFill>
+                  <a:srgbClr val="106040"/>
+                </a:solidFill>
+                <a:latin typeface="Roboto Mono"/>
+                <a:ea typeface="Roboto Mono"/>
+                <a:cs typeface="Roboto Mono"/>
+                <a:sym typeface="Roboto Mono"/>
+              </a:rPr>
+              <a:t>0.2</a:t>
+            </a:r>
+            <a:r>
+              <a:rPr lang="it" sz="1800">
+                <a:latin typeface="Roboto Mono"/>
+                <a:ea typeface="Roboto Mono"/>
+                <a:cs typeface="Roboto Mono"/>
+                <a:sym typeface="Roboto Mono"/>
+              </a:rPr>
+              <a:t>,</a:t>
+            </a:r>
+            <a:r>
+              <a:rPr lang="it" sz="1800">
+                <a:solidFill>
+                  <a:srgbClr val="106040"/>
+                </a:solidFill>
+                <a:latin typeface="Roboto Mono"/>
+                <a:ea typeface="Roboto Mono"/>
+                <a:cs typeface="Roboto Mono"/>
+                <a:sym typeface="Roboto Mono"/>
+              </a:rPr>
+              <a:t>0.3</a:t>
+            </a:r>
+            <a:r>
+              <a:rPr lang="it" sz="1800">
+                <a:latin typeface="Roboto Mono"/>
+                <a:ea typeface="Roboto Mono"/>
+                <a:cs typeface="Roboto Mono"/>
+                <a:sym typeface="Roboto Mono"/>
+              </a:rPr>
+              <a:t>};</a:t>
             </a:r>
             <a:endParaRPr sz="1800">
               <a:latin typeface="Roboto Mono"/>
@@ -16479,11 +15996,169 @@
                 <a:spcPts val="1200"/>
               </a:spcBef>
               <a:spcAft>
+                <a:spcPts val="0"/>
+              </a:spcAft>
+              <a:buNone/>
+            </a:pPr>
+            <a:r>
+              <a:rPr lang="it" sz="1800">
+                <a:solidFill>
+                  <a:srgbClr val="008050"/>
+                </a:solidFill>
+                <a:latin typeface="Roboto Mono"/>
+                <a:ea typeface="Roboto Mono"/>
+                <a:cs typeface="Roboto Mono"/>
+                <a:sym typeface="Roboto Mono"/>
+              </a:rPr>
+              <a:t>double</a:t>
+            </a:r>
+            <a:r>
+              <a:rPr lang="it" sz="1800">
+                <a:latin typeface="Roboto Mono"/>
+                <a:ea typeface="Roboto Mono"/>
+                <a:cs typeface="Roboto Mono"/>
+                <a:sym typeface="Roboto Mono"/>
+              </a:rPr>
+              <a:t> </a:t>
+            </a:r>
+            <a:r>
+              <a:rPr lang="it" sz="1800">
+                <a:solidFill>
+                  <a:srgbClr val="1AB1CD"/>
+                </a:solidFill>
+                <a:latin typeface="Roboto Mono"/>
+                <a:ea typeface="Roboto Mono"/>
+                <a:cs typeface="Roboto Mono"/>
+                <a:sym typeface="Roboto Mono"/>
+              </a:rPr>
+              <a:t>y</a:t>
+            </a:r>
+            <a:r>
+              <a:rPr lang="it" sz="1800">
+                <a:latin typeface="Roboto Mono"/>
+                <a:ea typeface="Roboto Mono"/>
+                <a:cs typeface="Roboto Mono"/>
+                <a:sym typeface="Roboto Mono"/>
+              </a:rPr>
+              <a:t>[] </a:t>
+            </a:r>
+            <a:r>
+              <a:rPr b="1" lang="it" sz="1800">
+                <a:solidFill>
+                  <a:srgbClr val="EE11FF"/>
+                </a:solidFill>
+                <a:latin typeface="Roboto Mono"/>
+                <a:ea typeface="Roboto Mono"/>
+                <a:cs typeface="Roboto Mono"/>
+                <a:sym typeface="Roboto Mono"/>
+              </a:rPr>
+              <a:t>=</a:t>
+            </a:r>
+            <a:r>
+              <a:rPr lang="it" sz="1800">
+                <a:latin typeface="Roboto Mono"/>
+                <a:ea typeface="Roboto Mono"/>
+                <a:cs typeface="Roboto Mono"/>
+                <a:sym typeface="Roboto Mono"/>
+              </a:rPr>
+              <a:t> {</a:t>
+            </a:r>
+            <a:r>
+              <a:rPr lang="it" sz="1800">
+                <a:solidFill>
+                  <a:srgbClr val="106040"/>
+                </a:solidFill>
+                <a:latin typeface="Roboto Mono"/>
+                <a:ea typeface="Roboto Mono"/>
+                <a:cs typeface="Roboto Mono"/>
+                <a:sym typeface="Roboto Mono"/>
+              </a:rPr>
+              <a:t>0.2</a:t>
+            </a:r>
+            <a:r>
+              <a:rPr lang="it" sz="1800">
+                <a:latin typeface="Roboto Mono"/>
+                <a:ea typeface="Roboto Mono"/>
+                <a:cs typeface="Roboto Mono"/>
+                <a:sym typeface="Roboto Mono"/>
+              </a:rPr>
+              <a:t>,</a:t>
+            </a:r>
+            <a:r>
+              <a:rPr lang="it" sz="1800">
+                <a:solidFill>
+                  <a:srgbClr val="106040"/>
+                </a:solidFill>
+                <a:latin typeface="Roboto Mono"/>
+                <a:ea typeface="Roboto Mono"/>
+                <a:cs typeface="Roboto Mono"/>
+                <a:sym typeface="Roboto Mono"/>
+              </a:rPr>
+              <a:t>0.3</a:t>
+            </a:r>
+            <a:r>
+              <a:rPr lang="it" sz="1800">
+                <a:latin typeface="Roboto Mono"/>
+                <a:ea typeface="Roboto Mono"/>
+                <a:cs typeface="Roboto Mono"/>
+                <a:sym typeface="Roboto Mono"/>
+              </a:rPr>
+              <a:t>,</a:t>
+            </a:r>
+            <a:r>
+              <a:rPr lang="it" sz="1800">
+                <a:solidFill>
+                  <a:srgbClr val="106040"/>
+                </a:solidFill>
+                <a:latin typeface="Roboto Mono"/>
+                <a:ea typeface="Roboto Mono"/>
+                <a:cs typeface="Roboto Mono"/>
+                <a:sym typeface="Roboto Mono"/>
+              </a:rPr>
+              <a:t>0.6</a:t>
+            </a:r>
+            <a:r>
+              <a:rPr lang="it" sz="1800">
+                <a:latin typeface="Roboto Mono"/>
+                <a:ea typeface="Roboto Mono"/>
+                <a:cs typeface="Roboto Mono"/>
+                <a:sym typeface="Roboto Mono"/>
+              </a:rPr>
+              <a:t>};</a:t>
+            </a:r>
+            <a:endParaRPr sz="1800">
+              <a:latin typeface="Roboto Mono"/>
+              <a:ea typeface="Roboto Mono"/>
+              <a:cs typeface="Roboto Mono"/>
+              <a:sym typeface="Roboto Mono"/>
+            </a:endParaRPr>
+          </a:p>
+          <a:p>
+            <a:pPr indent="0" lvl="0" marL="0" rtl="0" algn="l">
+              <a:lnSpc>
+                <a:spcPct val="115000"/>
+              </a:lnSpc>
+              <a:spcBef>
                 <a:spcPts val="1200"/>
+              </a:spcBef>
+              <a:spcAft>
+                <a:spcPts val="0"/>
               </a:spcAft>
               <a:buNone/>
             </a:pPr>
             <a:r>
+              <a:rPr b="1" lang="it" sz="1800">
+                <a:solidFill>
+                  <a:srgbClr val="EE11FF"/>
+                </a:solidFill>
+                <a:latin typeface="Roboto Mono"/>
+                <a:ea typeface="Roboto Mono"/>
+                <a:cs typeface="Roboto Mono"/>
+                <a:sym typeface="Roboto Mono"/>
+              </a:rPr>
+              <a:t>//</a:t>
+            </a:r>
+            <a:r>
               <a:rPr lang="it" sz="1800">
                 <a:solidFill>
                   <a:srgbClr val="1AB1CD"/>
@@ -16493,7 +16168,7 @@
                 <a:cs typeface="Roboto Mono"/>
                 <a:sym typeface="Roboto Mono"/>
               </a:rPr>
-              <a:t>TGraphErrors</a:t>
+              <a:t>x_err</a:t>
             </a:r>
             <a:r>
               <a:rPr lang="it" sz="1800">
@@ -16505,6 +16180,101 @@
               <a:t> </a:t>
             </a:r>
             <a:r>
+              <a:rPr lang="it" sz="1800">
+                <a:solidFill>
+                  <a:srgbClr val="1AB1CD"/>
+                </a:solidFill>
+                <a:latin typeface="Roboto Mono"/>
+                <a:ea typeface="Roboto Mono"/>
+                <a:cs typeface="Roboto Mono"/>
+                <a:sym typeface="Roboto Mono"/>
+              </a:rPr>
+              <a:t>nullo</a:t>
+            </a:r>
+            <a:endParaRPr sz="1800">
+              <a:latin typeface="Roboto Mono"/>
+              <a:ea typeface="Roboto Mono"/>
+              <a:cs typeface="Roboto Mono"/>
+              <a:sym typeface="Roboto Mono"/>
+            </a:endParaRPr>
+          </a:p>
+          <a:p>
+            <a:pPr indent="0" lvl="0" marL="0" rtl="0" algn="l">
+              <a:lnSpc>
+                <a:spcPct val="115000"/>
+              </a:lnSpc>
+              <a:spcBef>
+                <a:spcPts val="1200"/>
+              </a:spcBef>
+              <a:spcAft>
+                <a:spcPts val="0"/>
+              </a:spcAft>
+              <a:buNone/>
+            </a:pPr>
+            <a:r>
+              <a:rPr lang="it" sz="1800">
+                <a:solidFill>
+                  <a:srgbClr val="008050"/>
+                </a:solidFill>
+                <a:latin typeface="Roboto Mono"/>
+                <a:ea typeface="Roboto Mono"/>
+                <a:cs typeface="Roboto Mono"/>
+                <a:sym typeface="Roboto Mono"/>
+              </a:rPr>
+              <a:t>double</a:t>
+            </a:r>
+            <a:r>
+              <a:rPr lang="it" sz="1800">
+                <a:latin typeface="Roboto Mono"/>
+                <a:ea typeface="Roboto Mono"/>
+                <a:cs typeface="Roboto Mono"/>
+                <a:sym typeface="Roboto Mono"/>
+              </a:rPr>
+              <a:t> </a:t>
+            </a:r>
+            <a:r>
+              <a:rPr lang="it" sz="1800">
+                <a:solidFill>
+                  <a:srgbClr val="1AB1CD"/>
+                </a:solidFill>
+                <a:latin typeface="Roboto Mono"/>
+                <a:ea typeface="Roboto Mono"/>
+                <a:cs typeface="Roboto Mono"/>
+                <a:sym typeface="Roboto Mono"/>
+              </a:rPr>
+              <a:t>y_err</a:t>
+            </a:r>
+            <a:r>
+              <a:rPr lang="it" sz="1800">
+                <a:latin typeface="Roboto Mono"/>
+                <a:ea typeface="Roboto Mono"/>
+                <a:cs typeface="Roboto Mono"/>
+                <a:sym typeface="Roboto Mono"/>
+              </a:rPr>
+              <a:t>[</a:t>
+            </a:r>
+            <a:r>
+              <a:rPr lang="it" sz="1800">
+                <a:solidFill>
+                  <a:srgbClr val="1AB1CD"/>
+                </a:solidFill>
+                <a:latin typeface="Roboto Mono"/>
+                <a:ea typeface="Roboto Mono"/>
+                <a:cs typeface="Roboto Mono"/>
+                <a:sym typeface="Roboto Mono"/>
+              </a:rPr>
+              <a:t>n</a:t>
+            </a:r>
+            <a:r>
+              <a:rPr lang="it" sz="1800">
+                <a:latin typeface="Roboto Mono"/>
+                <a:ea typeface="Roboto Mono"/>
+                <a:cs typeface="Roboto Mono"/>
+                <a:sym typeface="Roboto Mono"/>
+              </a:rPr>
+              <a:t>] </a:t>
+            </a:r>
+            <a:r>
               <a:rPr b="1" lang="it" sz="1800">
                 <a:solidFill>
                   <a:srgbClr val="EE11FF"/>
@@ -16514,10 +16284,135 @@
                 <a:cs typeface="Roboto Mono"/>
                 <a:sym typeface="Roboto Mono"/>
               </a:rPr>
+              <a:t>=</a:t>
+            </a:r>
+            <a:r>
+              <a:rPr lang="it" sz="1800">
+                <a:latin typeface="Roboto Mono"/>
+                <a:ea typeface="Roboto Mono"/>
+                <a:cs typeface="Roboto Mono"/>
+                <a:sym typeface="Roboto Mono"/>
+              </a:rPr>
+              <a:t> {</a:t>
+            </a:r>
+            <a:r>
+              <a:rPr lang="it" sz="1800">
+                <a:solidFill>
+                  <a:srgbClr val="106040"/>
+                </a:solidFill>
+                <a:latin typeface="Roboto Mono"/>
+                <a:ea typeface="Roboto Mono"/>
+                <a:cs typeface="Roboto Mono"/>
+                <a:sym typeface="Roboto Mono"/>
+              </a:rPr>
+              <a:t>0.008</a:t>
+            </a:r>
+            <a:r>
+              <a:rPr lang="it" sz="1800">
+                <a:latin typeface="Roboto Mono"/>
+                <a:ea typeface="Roboto Mono"/>
+                <a:cs typeface="Roboto Mono"/>
+                <a:sym typeface="Roboto Mono"/>
+              </a:rPr>
+              <a:t>,</a:t>
+            </a:r>
+            <a:r>
+              <a:rPr lang="it" sz="1800">
+                <a:solidFill>
+                  <a:srgbClr val="106040"/>
+                </a:solidFill>
+                <a:latin typeface="Roboto Mono"/>
+                <a:ea typeface="Roboto Mono"/>
+                <a:cs typeface="Roboto Mono"/>
+                <a:sym typeface="Roboto Mono"/>
+              </a:rPr>
+              <a:t>0.008</a:t>
+            </a:r>
+            <a:r>
+              <a:rPr lang="it" sz="1800">
+                <a:latin typeface="Roboto Mono"/>
+                <a:ea typeface="Roboto Mono"/>
+                <a:cs typeface="Roboto Mono"/>
+                <a:sym typeface="Roboto Mono"/>
+              </a:rPr>
+              <a:t>,</a:t>
+            </a:r>
+            <a:r>
+              <a:rPr lang="it" sz="1800">
+                <a:solidFill>
+                  <a:srgbClr val="106040"/>
+                </a:solidFill>
+                <a:latin typeface="Roboto Mono"/>
+                <a:ea typeface="Roboto Mono"/>
+                <a:cs typeface="Roboto Mono"/>
+                <a:sym typeface="Roboto Mono"/>
+              </a:rPr>
+              <a:t>0.008</a:t>
+            </a:r>
+            <a:r>
+              <a:rPr lang="it" sz="1800">
+                <a:latin typeface="Roboto Mono"/>
+                <a:ea typeface="Roboto Mono"/>
+                <a:cs typeface="Roboto Mono"/>
+                <a:sym typeface="Roboto Mono"/>
+              </a:rPr>
+              <a:t>};</a:t>
+            </a:r>
+            <a:endParaRPr sz="1800">
+              <a:latin typeface="Roboto Mono"/>
+              <a:ea typeface="Roboto Mono"/>
+              <a:cs typeface="Roboto Mono"/>
+              <a:sym typeface="Roboto Mono"/>
+            </a:endParaRPr>
+          </a:p>
+          <a:p>
+            <a:pPr indent="0" lvl="0" marL="0" rtl="0" algn="l">
+              <a:lnSpc>
+                <a:spcPct val="115000"/>
+              </a:lnSpc>
+              <a:spcBef>
+                <a:spcPts val="1200"/>
+              </a:spcBef>
+              <a:spcAft>
+                <a:spcPts val="1200"/>
+              </a:spcAft>
+              <a:buNone/>
+            </a:pPr>
+            <a:r>
+              <a:rPr lang="it" sz="1800">
+                <a:solidFill>
+                  <a:srgbClr val="1AB1CD"/>
+                </a:solidFill>
+                <a:latin typeface="Roboto Mono"/>
+                <a:ea typeface="Roboto Mono"/>
+                <a:cs typeface="Roboto Mono"/>
+                <a:sym typeface="Roboto Mono"/>
+              </a:rPr>
+              <a:t>TGraph</a:t>
+            </a:r>
+            <a:r>
+              <a:rPr b="1" lang="it" sz="1800">
+                <a:solidFill>
+                  <a:srgbClr val="EE11FF"/>
+                </a:solidFill>
+                <a:latin typeface="Roboto Mono"/>
+                <a:ea typeface="Roboto Mono"/>
+                <a:cs typeface="Roboto Mono"/>
+                <a:sym typeface="Roboto Mono"/>
+              </a:rPr>
               <a:t>*</a:t>
             </a:r>
             <a:r>
               <a:rPr lang="it" sz="1800">
+                <a:latin typeface="Roboto Mono"/>
+                <a:ea typeface="Roboto Mono"/>
+                <a:cs typeface="Roboto Mono"/>
+                <a:sym typeface="Roboto Mono"/>
+              </a:rPr>
+              <a:t> </a:t>
+            </a:r>
+            <a:r>
+              <a:rPr lang="it" sz="1800">
                 <a:solidFill>
                   <a:srgbClr val="1AB1CD"/>
                 </a:solidFill>
@@ -16526,7 +16421,7 @@
                 <a:cs typeface="Roboto Mono"/>
                 <a:sym typeface="Roboto Mono"/>
               </a:rPr>
-              <a:t>grafico</a:t>
+              <a:t>gr</a:t>
             </a:r>
             <a:r>
               <a:rPr lang="it" sz="1800">
@@ -16589,7 +16484,7 @@
                 <a:cs typeface="Roboto Mono"/>
                 <a:sym typeface="Roboto Mono"/>
               </a:rPr>
-              <a:t>TGraphErrors</a:t>
+              <a:t>TGraph</a:t>
             </a:r>
             <a:r>
               <a:rPr lang="it" sz="1800">
@@ -16610,16 +16505,16 @@
                 <a:cs typeface="Roboto Mono"/>
                 <a:sym typeface="Roboto Mono"/>
               </a:rPr>
-              <a:t>“file</a:t>
-            </a:r>
-            <a:r>
-              <a:rPr lang="it" sz="1800">
-                <a:latin typeface="Roboto Mono"/>
-                <a:ea typeface="Roboto Mono"/>
-                <a:cs typeface="Roboto Mono"/>
-                <a:sym typeface="Roboto Mono"/>
-              </a:rPr>
-              <a:t>.</a:t>
+              <a:t>n</a:t>
+            </a:r>
+            <a:r>
+              <a:rPr lang="it" sz="1800">
+                <a:latin typeface="Roboto Mono"/>
+                <a:ea typeface="Roboto Mono"/>
+                <a:cs typeface="Roboto Mono"/>
+                <a:sym typeface="Roboto Mono"/>
+              </a:rPr>
+              <a:t>, </a:t>
             </a:r>
             <a:r>
               <a:rPr lang="it" sz="1800">
@@ -16631,16 +16526,37 @@
                 <a:cs typeface="Roboto Mono"/>
                 <a:sym typeface="Roboto Mono"/>
               </a:rPr>
-              <a:t>txt”,"%lg %lg %lg"</a:t>
-            </a:r>
-            <a:r>
-              <a:rPr lang="it" sz="1800">
-                <a:latin typeface="Roboto Mono"/>
-                <a:ea typeface="Roboto Mono"/>
-                <a:cs typeface="Roboto Mono"/>
-                <a:sym typeface="Roboto Mono"/>
-              </a:rPr>
-              <a:t>);</a:t>
+              <a:t>x</a:t>
+            </a:r>
+            <a:r>
+              <a:rPr lang="it" sz="1800">
+                <a:latin typeface="Roboto Mono"/>
+                <a:ea typeface="Roboto Mono"/>
+                <a:cs typeface="Roboto Mono"/>
+                <a:sym typeface="Roboto Mono"/>
+              </a:rPr>
+              <a:t>, </a:t>
+            </a:r>
+            <a:r>
+              <a:rPr lang="it" sz="1800">
+                <a:solidFill>
+                  <a:srgbClr val="1AB1CD"/>
+                </a:solidFill>
+                <a:latin typeface="Roboto Mono"/>
+                <a:ea typeface="Roboto Mono"/>
+                <a:cs typeface="Roboto Mono"/>
+                <a:sym typeface="Roboto Mono"/>
+              </a:rPr>
+              <a:t>y,nullptr,y_err</a:t>
+            </a:r>
+            <a:r>
+              <a:rPr lang="it" sz="1800">
+                <a:latin typeface="Roboto Mono"/>
+                <a:ea typeface="Roboto Mono"/>
+                <a:cs typeface="Roboto Mono"/>
+                <a:sym typeface="Roboto Mono"/>
+              </a:rPr>
+              <a:t>); </a:t>
             </a:r>
             <a:endParaRPr sz="1800">
               <a:latin typeface="Roboto Mono"/>
@@ -16660,6 +16576,285 @@
 </file>
 
 <file path=ppt/theme/theme1.xml><?xml version="1.0" encoding="utf-8"?>
+<a:theme xmlns:a="http://schemas.openxmlformats.org/drawingml/2006/main" xmlns:r="http://schemas.openxmlformats.org/officeDocument/2006/relationships">
+  <a:themeElements>
+    <a:clrScheme name="Default">
+      <a:dk1>
+        <a:srgbClr val="000000"/>
+      </a:dk1>
+      <a:lt1>
+        <a:srgbClr val="FFFFFF"/>
+      </a:lt1>
+      <a:dk2>
+        <a:srgbClr val="158158"/>
+      </a:dk2>
+      <a:lt2>
+        <a:srgbClr val="F3F3F3"/>
+      </a:lt2>
+      <a:accent1>
+        <a:srgbClr val="058DC7"/>
+      </a:accent1>
+      <a:accent2>
+        <a:srgbClr val="50B432"/>
+      </a:accent2>
+      <a:accent3>
+        <a:srgbClr val="ED561B"/>
+      </a:accent3>
+      <a:accent4>
+        <a:srgbClr val="EDEF00"/>
+      </a:accent4>
+      <a:accent5>
+        <a:srgbClr val="24CBE5"/>
+      </a:accent5>
+      <a:accent6>
+        <a:srgbClr val="64E572"/>
+      </a:accent6>
+      <a:hlink>
+        <a:srgbClr val="2200CC"/>
+      </a:hlink>
+      <a:folHlink>
+        <a:srgbClr val="551A8B"/>
+      </a:folHlink>
+    </a:clrScheme>
+    <a:fontScheme name="Office">
+      <a:majorFont>
+        <a:latin typeface="Arial"/>
+        <a:ea typeface=""/>
+        <a:cs typeface=""/>
+        <a:font script="Jpan" typeface="ＭＳ Ｐゴシック"/>
+        <a:font script="Hang" typeface="맑은 고딕"/>
+        <a:font script="Hans" typeface="宋体"/>
+        <a:font script="Hant" typeface="新細明體"/>
+        <a:font script="Arab" typeface="Times New Roman"/>
+        <a:font script="Hebr" typeface="Times New Roman"/>
+        <a:font script="Thai" typeface="Angsana New"/>
+        <a:font script="Ethi" typeface="Nyala"/>
+        <a:font script="Beng" typeface="Vrinda"/>
+        <a:font script="Gujr" typeface="Shruti"/>
+        <a:font script="Khmr" typeface="MoolBoran"/>
+        <a:font script="Knda" typeface="Tunga"/>
+        <a:font script="Guru" typeface="Raavi"/>
+        <a:font script="Cans" typeface="Euphemia"/>
+        <a:font script="Cher" typeface="Plantagenet Cherokee"/>
+        <a:font script="Yiii" typeface="Microsoft Yi Baiti"/>
+        <a:font script="Tibt" typeface="Microsoft Himalaya"/>
+        <a:font script="Thaa" typeface="MV Boli"/>
+        <a:font script="Deva" typeface="Mangal"/>
+        <a:font script="Telu" typeface="Gautami"/>
+        <a:font script="Taml" typeface="Latha"/>
+        <a:font script="Syrc" typeface="Estrangelo Edessa"/>
+        <a:font script="Orya" typeface="Kalinga"/>
+        <a:font script="Mlym" typeface="Kartika"/>
+        <a:font script="Laoo" typeface="DokChampa"/>
+        <a:font script="Sinh" typeface="Iskoola Pota"/>
+        <a:font script="Mong" typeface="Mongolian Baiti"/>
+        <a:font script="Viet" typeface="Times New Roman"/>
+        <a:font script="Uigh" typeface="Microsoft Uighur"/>
+        <a:font script="Geor" typeface="Sylfaen"/>
+      </a:majorFont>
+      <a:minorFont>
+        <a:latin typeface="Arial"/>
+        <a:ea typeface=""/>
+        <a:cs typeface=""/>
+        <a:font script="Jpan" typeface="ＭＳ Ｐゴシック"/>
+        <a:font script="Hang" typeface="맑은 고딕"/>
+        <a:font script="Hans" typeface="宋体"/>
+        <a:font script="Hant" typeface="新細明體"/>
+        <a:font script="Arab" typeface="Arial"/>
+        <a:font script="Hebr" typeface="Arial"/>
+        <a:font script="Thai" typeface="Cordia New"/>
+        <a:font script="Ethi" typeface="Nyala"/>
+        <a:font script="Beng" typeface="Vrinda"/>
+        <a:font script="Gujr" typeface="Shruti"/>
+        <a:font script="Khmr" typeface="DaunPenh"/>
+        <a:font script="Knda" typeface="Tunga"/>
+        <a:font script="Guru" typeface="Raavi"/>
+        <a:font script="Cans" typeface="Euphemia"/>
+        <a:font script="Cher" typeface="Plantagenet Cherokee"/>
+        <a:font script="Yiii" typeface="Microsoft Yi Baiti"/>
+        <a:font script="Tibt" typeface="Microsoft Himalaya"/>
+        <a:font script="Thaa" typeface="MV Boli"/>
+        <a:font script="Deva" typeface="Mangal"/>
+        <a:font script="Telu" typeface="Gautami"/>
+        <a:font script="Taml" typeface="Latha"/>
+        <a:font script="Syrc" typeface="Estrangelo Edessa"/>
+        <a:font script="Orya" typeface="Kalinga"/>
+        <a:font script="Mlym" typeface="Kartika"/>
+        <a:font script="Laoo" typeface="DokChampa"/>
+        <a:font script="Sinh" typeface="Iskoola Pota"/>
+        <a:font script="Mong" typeface="Mongolian Baiti"/>
+        <a:font script="Viet" typeface="Arial"/>
+        <a:font script="Uigh" typeface="Microsoft Uighur"/>
+        <a:font script="Geor" typeface="Sylfaen"/>
+      </a:minorFont>
+    </a:fontScheme>
+    <a:fmtScheme name="Office">
+      <a:fillStyleLst>
+        <a:solidFill>
+          <a:schemeClr val="phClr"/>
+        </a:solidFill>
+        <a:gradFill rotWithShape="1">
+          <a:gsLst>
+            <a:gs pos="0">
+              <a:schemeClr val="phClr">
+                <a:tint val="50000"/>
+                <a:satMod val="300000"/>
+              </a:schemeClr>
+            </a:gs>
+            <a:gs pos="35000">
+              <a:schemeClr val="phClr">
+                <a:tint val="37000"/>
+                <a:satMod val="300000"/>
+              </a:schemeClr>
+            </a:gs>
+            <a:gs pos="100000">
+              <a:schemeClr val="phClr">
+                <a:tint val="15000"/>
+                <a:satMod val="350000"/>
+              </a:schemeClr>
+            </a:gs>
+          </a:gsLst>
+          <a:lin ang="16200000" scaled="1"/>
+        </a:gradFill>
+        <a:gradFill rotWithShape="1">
+          <a:gsLst>
+            <a:gs pos="0">
+              <a:schemeClr val="phClr">
+                <a:tint val="100000"/>
+                <a:shade val="100000"/>
+                <a:satMod val="130000"/>
+              </a:schemeClr>
+            </a:gs>
+            <a:gs pos="100000">
+              <a:schemeClr val="phClr">
+                <a:tint val="50000"/>
+                <a:shade val="100000"/>
+                <a:satMod val="350000"/>
+              </a:schemeClr>
+            </a:gs>
+          </a:gsLst>
+          <a:lin ang="16200000" scaled="0"/>
+        </a:gradFill>
+      </a:fillStyleLst>
+      <a:lnStyleLst>
+        <a:ln w="9525" cap="flat" cmpd="sng" algn="ctr">
+          <a:solidFill>
+            <a:schemeClr val="phClr">
+              <a:shade val="95000"/>
+              <a:satMod val="105000"/>
+            </a:schemeClr>
+          </a:solidFill>
+          <a:prstDash val="solid"/>
+        </a:ln>
+        <a:ln w="25400" cap="flat" cmpd="sng" algn="ctr">
+          <a:solidFill>
+            <a:schemeClr val="phClr"/>
+          </a:solidFill>
+          <a:prstDash val="solid"/>
+        </a:ln>
+        <a:ln w="38100" cap="flat" cmpd="sng" algn="ctr">
+          <a:solidFill>
+            <a:schemeClr val="phClr"/>
+          </a:solidFill>
+          <a:prstDash val="solid"/>
+        </a:ln>
+      </a:lnStyleLst>
+      <a:effectStyleLst>
+        <a:effectStyle>
+          <a:effectLst>
+            <a:outerShdw blurRad="40000" dist="20000" dir="5400000" rotWithShape="0">
+              <a:srgbClr val="000000">
+                <a:alpha val="38000"/>
+              </a:srgbClr>
+            </a:outerShdw>
+          </a:effectLst>
+        </a:effectStyle>
+        <a:effectStyle>
+          <a:effectLst>
+            <a:outerShdw blurRad="40000" dist="23000" dir="5400000" rotWithShape="0">
+              <a:srgbClr val="000000">
+                <a:alpha val="35000"/>
+              </a:srgbClr>
+            </a:outerShdw>
+          </a:effectLst>
+        </a:effectStyle>
+        <a:effectStyle>
+          <a:effectLst>
+            <a:outerShdw blurRad="40000" dist="23000" dir="5400000" rotWithShape="0">
+              <a:srgbClr val="000000">
+                <a:alpha val="35000"/>
+              </a:srgbClr>
+            </a:outerShdw>
+          </a:effectLst>
+          <a:scene3d>
+            <a:camera prst="orthographicFront">
+              <a:rot lat="0" lon="0" rev="0"/>
+            </a:camera>
+            <a:lightRig rig="threePt" dir="t">
+              <a:rot lat="0" lon="0" rev="1200000"/>
+            </a:lightRig>
+          </a:scene3d>
+          <a:sp3d>
+            <a:bevelT w="63500" h="25400"/>
+          </a:sp3d>
+        </a:effectStyle>
+      </a:effectStyleLst>
+      <a:bgFillStyleLst>
+        <a:solidFill>
+          <a:schemeClr val="phClr"/>
+        </a:solidFill>
+        <a:gradFill rotWithShape="1">
+          <a:gsLst>
+            <a:gs pos="0">
+              <a:schemeClr val="phClr">
+                <a:tint val="40000"/>
+                <a:satMod val="350000"/>
+              </a:schemeClr>
+            </a:gs>
+            <a:gs pos="40000">
+              <a:schemeClr val="phClr">
+                <a:tint val="45000"/>
+                <a:shade val="99000"/>
+                <a:satMod val="350000"/>
+              </a:schemeClr>
+            </a:gs>
+            <a:gs pos="100000">
+              <a:schemeClr val="phClr">
+                <a:shade val="20000"/>
+                <a:satMod val="255000"/>
+              </a:schemeClr>
+            </a:gs>
+          </a:gsLst>
+          <a:path path="circle">
+            <a:fillToRect l="50000" t="-80000" r="50000" b="180000"/>
+          </a:path>
+        </a:gradFill>
+        <a:gradFill rotWithShape="1">
+          <a:gsLst>
+            <a:gs pos="0">
+              <a:schemeClr val="phClr">
+                <a:tint val="80000"/>
+                <a:satMod val="300000"/>
+              </a:schemeClr>
+            </a:gs>
+            <a:gs pos="100000">
+              <a:schemeClr val="phClr">
+                <a:shade val="30000"/>
+                <a:satMod val="200000"/>
+              </a:schemeClr>
+            </a:gs>
+          </a:gsLst>
+          <a:path path="circle">
+            <a:fillToRect l="50000" t="50000" r="50000" b="50000"/>
+          </a:path>
+        </a:gradFill>
+      </a:bgFillStyleLst>
+    </a:fmtScheme>
+  </a:themeElements>
+</a:theme>
+</file>
+
+<file path=ppt/theme/theme2.xml><?xml version="1.0" encoding="utf-8"?>
 <a:theme xmlns:a="http://schemas.openxmlformats.org/drawingml/2006/main" xmlns:r="http://schemas.openxmlformats.org/officeDocument/2006/relationships" name="Simple Dark">
   <a:themeElements>
     <a:clrScheme name="Simple Dark">
@@ -16936,283 +17131,4 @@
     </a:fmtScheme>
   </a:themeElements>
 </a:theme>
-</file>
-
-<file path=ppt/theme/theme2.xml><?xml version="1.0" encoding="utf-8"?>
-<a:theme xmlns:a="http://schemas.openxmlformats.org/drawingml/2006/main" xmlns:r="http://schemas.openxmlformats.org/officeDocument/2006/relationships">
-  <a:themeElements>
-    <a:clrScheme name="Default">
-      <a:dk1>
-        <a:srgbClr val="000000"/>
-      </a:dk1>
-      <a:lt1>
-        <a:srgbClr val="FFFFFF"/>
-      </a:lt1>
-      <a:dk2>
-        <a:srgbClr val="158158"/>
-      </a:dk2>
-      <a:lt2>
-        <a:srgbClr val="F3F3F3"/>
-      </a:lt2>
-      <a:accent1>
-        <a:srgbClr val="058DC7"/>
-      </a:accent1>
-      <a:accent2>
-        <a:srgbClr val="50B432"/>
-      </a:accent2>
-      <a:accent3>
-        <a:srgbClr val="ED561B"/>
-      </a:accent3>
-      <a:accent4>
-        <a:srgbClr val="EDEF00"/>
-      </a:accent4>
-      <a:accent5>
-        <a:srgbClr val="24CBE5"/>
-      </a:accent5>
-      <a:accent6>
-        <a:srgbClr val="64E572"/>
-      </a:accent6>
-      <a:hlink>
-        <a:srgbClr val="2200CC"/>
-      </a:hlink>
-      <a:folHlink>
-        <a:srgbClr val="551A8B"/>
-      </a:folHlink>
-    </a:clrScheme>
-    <a:fontScheme name="Office">
-      <a:majorFont>
-        <a:latin typeface="Arial"/>
-        <a:ea typeface=""/>
-        <a:cs typeface=""/>
-        <a:font script="Jpan" typeface="ＭＳ Ｐゴシック"/>
-        <a:font script="Hang" typeface="맑은 고딕"/>
-        <a:font script="Hans" typeface="宋体"/>
-        <a:font script="Hant" typeface="新細明體"/>
-        <a:font script="Arab" typeface="Times New Roman"/>
-        <a:font script="Hebr" typeface="Times New Roman"/>
-        <a:font script="Thai" typeface="Angsana New"/>
-        <a:font script="Ethi" typeface="Nyala"/>
-        <a:font script="Beng" typeface="Vrinda"/>
-        <a:font script="Gujr" typeface="Shruti"/>
-        <a:font script="Khmr" typeface="MoolBoran"/>
-        <a:font script="Knda" typeface="Tunga"/>
-        <a:font script="Guru" typeface="Raavi"/>
-        <a:font script="Cans" typeface="Euphemia"/>
-        <a:font script="Cher" typeface="Plantagenet Cherokee"/>
-        <a:font script="Yiii" typeface="Microsoft Yi Baiti"/>
-        <a:font script="Tibt" typeface="Microsoft Himalaya"/>
-        <a:font script="Thaa" typeface="MV Boli"/>
-        <a:font script="Deva" typeface="Mangal"/>
-        <a:font script="Telu" typeface="Gautami"/>
-        <a:font script="Taml" typeface="Latha"/>
-        <a:font script="Syrc" typeface="Estrangelo Edessa"/>
-        <a:font script="Orya" typeface="Kalinga"/>
-        <a:font script="Mlym" typeface="Kartika"/>
-        <a:font script="Laoo" typeface="DokChampa"/>
-        <a:font script="Sinh" typeface="Iskoola Pota"/>
-        <a:font script="Mong" typeface="Mongolian Baiti"/>
-        <a:font script="Viet" typeface="Times New Roman"/>
-        <a:font script="Uigh" typeface="Microsoft Uighur"/>
-        <a:font script="Geor" typeface="Sylfaen"/>
-      </a:majorFont>
-      <a:minorFont>
-        <a:latin typeface="Arial"/>
-        <a:ea typeface=""/>
-        <a:cs typeface=""/>
-        <a:font script="Jpan" typeface="ＭＳ Ｐゴシック"/>
-        <a:font script="Hang" typeface="맑은 고딕"/>
-        <a:font script="Hans" typeface="宋体"/>
-        <a:font script="Hant" typeface="新細明體"/>
-        <a:font script="Arab" typeface="Arial"/>
-        <a:font script="Hebr" typeface="Arial"/>
-        <a:font script="Thai" typeface="Cordia New"/>
-        <a:font script="Ethi" typeface="Nyala"/>
-        <a:font script="Beng" typeface="Vrinda"/>
-        <a:font script="Gujr" typeface="Shruti"/>
-        <a:font script="Khmr" typeface="DaunPenh"/>
-        <a:font script="Knda" typeface="Tunga"/>
-        <a:font script="Guru" typeface="Raavi"/>
-        <a:font script="Cans" typeface="Euphemia"/>
-        <a:font script="Cher" typeface="Plantagenet Cherokee"/>
-        <a:font script="Yiii" typeface="Microsoft Yi Baiti"/>
-        <a:font script="Tibt" typeface="Microsoft Himalaya"/>
-        <a:font script="Thaa" typeface="MV Boli"/>
-        <a:font script="Deva" typeface="Mangal"/>
-        <a:font script="Telu" typeface="Gautami"/>
-        <a:font script="Taml" typeface="Latha"/>
-        <a:font script="Syrc" typeface="Estrangelo Edessa"/>
-        <a:font script="Orya" typeface="Kalinga"/>
-        <a:font script="Mlym" typeface="Kartika"/>
-        <a:font script="Laoo" typeface="DokChampa"/>
-        <a:font script="Sinh" typeface="Iskoola Pota"/>
-        <a:font script="Mong" typeface="Mongolian Baiti"/>
-        <a:font script="Viet" typeface="Arial"/>
-        <a:font script="Uigh" typeface="Microsoft Uighur"/>
-        <a:font script="Geor" typeface="Sylfaen"/>
-      </a:minorFont>
-    </a:fontScheme>
-    <a:fmtScheme name="Office">
-      <a:fillStyleLst>
-        <a:solidFill>
-          <a:schemeClr val="phClr"/>
-        </a:solidFill>
-        <a:gradFill rotWithShape="1">
-          <a:gsLst>
-            <a:gs pos="0">
-              <a:schemeClr val="phClr">
-                <a:tint val="50000"/>
-                <a:satMod val="300000"/>
-              </a:schemeClr>
-            </a:gs>
-            <a:gs pos="35000">
-              <a:schemeClr val="phClr">
-                <a:tint val="37000"/>
-                <a:satMod val="300000"/>
-              </a:schemeClr>
-            </a:gs>
-            <a:gs pos="100000">
-              <a:schemeClr val="phClr">
-                <a:tint val="15000"/>
-                <a:satMod val="350000"/>
-              </a:schemeClr>
-            </a:gs>
-          </a:gsLst>
-          <a:lin ang="16200000" scaled="1"/>
-        </a:gradFill>
-        <a:gradFill rotWithShape="1">
-          <a:gsLst>
-            <a:gs pos="0">
-              <a:schemeClr val="phClr">
-                <a:tint val="100000"/>
-                <a:shade val="100000"/>
-                <a:satMod val="130000"/>
-              </a:schemeClr>
-            </a:gs>
-            <a:gs pos="100000">
-              <a:schemeClr val="phClr">
-                <a:tint val="50000"/>
-                <a:shade val="100000"/>
-                <a:satMod val="350000"/>
-              </a:schemeClr>
-            </a:gs>
-          </a:gsLst>
-          <a:lin ang="16200000" scaled="0"/>
-        </a:gradFill>
-      </a:fillStyleLst>
-      <a:lnStyleLst>
-        <a:ln w="9525" cap="flat" cmpd="sng" algn="ctr">
-          <a:solidFill>
-            <a:schemeClr val="phClr">
-              <a:shade val="95000"/>
-              <a:satMod val="105000"/>
-            </a:schemeClr>
-          </a:solidFill>
-          <a:prstDash val="solid"/>
-        </a:ln>
-        <a:ln w="25400" cap="flat" cmpd="sng" algn="ctr">
-          <a:solidFill>
-            <a:schemeClr val="phClr"/>
-          </a:solidFill>
-          <a:prstDash val="solid"/>
-        </a:ln>
-        <a:ln w="38100" cap="flat" cmpd="sng" algn="ctr">
-          <a:solidFill>
-            <a:schemeClr val="phClr"/>
-          </a:solidFill>
-          <a:prstDash val="solid"/>
-        </a:ln>
-      </a:lnStyleLst>
-      <a:effectStyleLst>
-        <a:effectStyle>
-          <a:effectLst>
-            <a:outerShdw blurRad="40000" dist="20000" dir="5400000" rotWithShape="0">
-              <a:srgbClr val="000000">
-                <a:alpha val="38000"/>
-              </a:srgbClr>
-            </a:outerShdw>
-          </a:effectLst>
-        </a:effectStyle>
-        <a:effectStyle>
-          <a:effectLst>
-            <a:outerShdw blurRad="40000" dist="23000" dir="5400000" rotWithShape="0">
-              <a:srgbClr val="000000">
-                <a:alpha val="35000"/>
-              </a:srgbClr>
-            </a:outerShdw>
-          </a:effectLst>
-        </a:effectStyle>
-        <a:effectStyle>
-          <a:effectLst>
-            <a:outerShdw blurRad="40000" dist="23000" dir="5400000" rotWithShape="0">
-              <a:srgbClr val="000000">
-                <a:alpha val="35000"/>
-              </a:srgbClr>
-            </a:outerShdw>
-          </a:effectLst>
-          <a:scene3d>
-            <a:camera prst="orthographicFront">
-              <a:rot lat="0" lon="0" rev="0"/>
-            </a:camera>
-            <a:lightRig rig="threePt" dir="t">
-              <a:rot lat="0" lon="0" rev="1200000"/>
-            </a:lightRig>
-          </a:scene3d>
-          <a:sp3d>
-            <a:bevelT w="63500" h="25400"/>
-          </a:sp3d>
-        </a:effectStyle>
-      </a:effectStyleLst>
-      <a:bgFillStyleLst>
-        <a:solidFill>
-          <a:schemeClr val="phClr"/>
-        </a:solidFill>
-        <a:gradFill rotWithShape="1">
-          <a:gsLst>
-            <a:gs pos="0">
-              <a:schemeClr val="phClr">
-                <a:tint val="40000"/>
-                <a:satMod val="350000"/>
-              </a:schemeClr>
-            </a:gs>
-            <a:gs pos="40000">
-              <a:schemeClr val="phClr">
-                <a:tint val="45000"/>
-                <a:shade val="99000"/>
-                <a:satMod val="350000"/>
-              </a:schemeClr>
-            </a:gs>
-            <a:gs pos="100000">
-              <a:schemeClr val="phClr">
-                <a:shade val="20000"/>
-                <a:satMod val="255000"/>
-              </a:schemeClr>
-            </a:gs>
-          </a:gsLst>
-          <a:path path="circle">
-            <a:fillToRect l="50000" t="-80000" r="50000" b="180000"/>
-          </a:path>
-        </a:gradFill>
-        <a:gradFill rotWithShape="1">
-          <a:gsLst>
-            <a:gs pos="0">
-              <a:schemeClr val="phClr">
-                <a:tint val="80000"/>
-                <a:satMod val="300000"/>
-              </a:schemeClr>
-            </a:gs>
-            <a:gs pos="100000">
-              <a:schemeClr val="phClr">
-                <a:shade val="30000"/>
-                <a:satMod val="200000"/>
-              </a:schemeClr>
-            </a:gs>
-          </a:gsLst>
-          <a:path path="circle">
-            <a:fillToRect l="50000" t="50000" r="50000" b="50000"/>
-          </a:path>
-        </a:gradFill>
-      </a:bgFillStyleLst>
-    </a:fmtScheme>
-  </a:themeElements>
-</a:theme>
 </file>
</xml_diff>